<commit_message>
Minor changes 2022-10-19 (week 3)
</commit_message>
<xml_diff>
--- a/Basic_python/10 Set and Dictionary.pptx
+++ b/Basic_python/10 Set and Dictionary.pptx
@@ -139,14 +139,6 @@
 </p:presentation>
 </file>
 
-<file path=ppt/revisionInfo.xml><?xml version="1.0" encoding="utf-8"?>
-<p1510:revInfo xmlns:a="http://schemas.openxmlformats.org/drawingml/2006/main" xmlns:r="http://schemas.openxmlformats.org/officeDocument/2006/relationships" xmlns:p1510="http://schemas.microsoft.com/office/powerpoint/2015/10/main">
-  <p1510:revLst>
-    <p1510:client id="{F6217996-22F4-4438-B29F-CD4019CD8A36}" v="1" dt="2022-05-25T13:08:09.235"/>
-  </p1510:revLst>
-</p1510:revInfo>
-</file>
-
 <file path=ppt/changesInfos/changesInfo1.xml><?xml version="1.0" encoding="utf-8"?>
 <pc:chgInfo xmlns:a="http://schemas.openxmlformats.org/drawingml/2006/main" xmlns:r="http://schemas.openxmlformats.org/officeDocument/2006/relationships" xmlns:ac="http://schemas.microsoft.com/office/drawing/2013/main/command" xmlns:pc="http://schemas.microsoft.com/office/powerpoint/2013/main/command">
   <pc:docChgLst>
@@ -156,6 +148,105 @@
       <pc:docMkLst>
         <pc:docMk/>
       </pc:docMkLst>
+    </pc:docChg>
+  </pc:docChgLst>
+  <pc:docChgLst>
+    <pc:chgData name="Brent Pulmans" userId="8ae858ac-1a5b-43d2-9c3f-1bf2d06d427e" providerId="ADAL" clId="{2B702FFD-AF59-4837-A895-A83D32041250}"/>
+    <pc:docChg chg="modSld">
+      <pc:chgData name="Brent Pulmans" userId="8ae858ac-1a5b-43d2-9c3f-1bf2d06d427e" providerId="ADAL" clId="{2B702FFD-AF59-4837-A895-A83D32041250}" dt="2022-10-18T18:49:39.238" v="10" actId="20577"/>
+      <pc:docMkLst>
+        <pc:docMk/>
+      </pc:docMkLst>
+      <pc:sldChg chg="modSp mod">
+        <pc:chgData name="Brent Pulmans" userId="8ae858ac-1a5b-43d2-9c3f-1bf2d06d427e" providerId="ADAL" clId="{2B702FFD-AF59-4837-A895-A83D32041250}" dt="2022-10-18T18:49:04.097" v="6" actId="20577"/>
+        <pc:sldMkLst>
+          <pc:docMk/>
+          <pc:sldMk cId="1180478497" sldId="323"/>
+        </pc:sldMkLst>
+        <pc:spChg chg="mod">
+          <ac:chgData name="Brent Pulmans" userId="8ae858ac-1a5b-43d2-9c3f-1bf2d06d427e" providerId="ADAL" clId="{2B702FFD-AF59-4837-A895-A83D32041250}" dt="2022-10-18T18:49:04.097" v="6" actId="20577"/>
+          <ac:spMkLst>
+            <pc:docMk/>
+            <pc:sldMk cId="1180478497" sldId="323"/>
+            <ac:spMk id="3" creationId="{15A8D2C8-E201-4205-BF13-7574A25393F9}"/>
+          </ac:spMkLst>
+        </pc:spChg>
+      </pc:sldChg>
+      <pc:sldChg chg="modSp mod">
+        <pc:chgData name="Brent Pulmans" userId="8ae858ac-1a5b-43d2-9c3f-1bf2d06d427e" providerId="ADAL" clId="{2B702FFD-AF59-4837-A895-A83D32041250}" dt="2022-10-18T18:49:39.238" v="10" actId="20577"/>
+        <pc:sldMkLst>
+          <pc:docMk/>
+          <pc:sldMk cId="568040701" sldId="331"/>
+        </pc:sldMkLst>
+        <pc:spChg chg="mod">
+          <ac:chgData name="Brent Pulmans" userId="8ae858ac-1a5b-43d2-9c3f-1bf2d06d427e" providerId="ADAL" clId="{2B702FFD-AF59-4837-A895-A83D32041250}" dt="2022-10-18T18:49:39.238" v="10" actId="20577"/>
+          <ac:spMkLst>
+            <pc:docMk/>
+            <pc:sldMk cId="568040701" sldId="331"/>
+            <ac:spMk id="3" creationId="{C84F3811-C236-48AF-A55C-2D00E112F523}"/>
+          </ac:spMkLst>
+        </pc:spChg>
+      </pc:sldChg>
+      <pc:sldChg chg="modSp mod">
+        <pc:chgData name="Brent Pulmans" userId="8ae858ac-1a5b-43d2-9c3f-1bf2d06d427e" providerId="ADAL" clId="{2B702FFD-AF59-4837-A895-A83D32041250}" dt="2022-10-18T18:17:23.074" v="0" actId="255"/>
+        <pc:sldMkLst>
+          <pc:docMk/>
+          <pc:sldMk cId="2203470941" sldId="430"/>
+        </pc:sldMkLst>
+        <pc:spChg chg="mod">
+          <ac:chgData name="Brent Pulmans" userId="8ae858ac-1a5b-43d2-9c3f-1bf2d06d427e" providerId="ADAL" clId="{2B702FFD-AF59-4837-A895-A83D32041250}" dt="2022-10-18T18:17:23.074" v="0" actId="255"/>
+          <ac:spMkLst>
+            <pc:docMk/>
+            <pc:sldMk cId="2203470941" sldId="430"/>
+            <ac:spMk id="3" creationId="{00000000-0000-0000-0000-000000000000}"/>
+          </ac:spMkLst>
+        </pc:spChg>
+      </pc:sldChg>
+      <pc:sldChg chg="modSp mod">
+        <pc:chgData name="Brent Pulmans" userId="8ae858ac-1a5b-43d2-9c3f-1bf2d06d427e" providerId="ADAL" clId="{2B702FFD-AF59-4837-A895-A83D32041250}" dt="2022-10-18T18:18:26.489" v="2" actId="14100"/>
+        <pc:sldMkLst>
+          <pc:docMk/>
+          <pc:sldMk cId="199476424" sldId="431"/>
+        </pc:sldMkLst>
+        <pc:spChg chg="mod">
+          <ac:chgData name="Brent Pulmans" userId="8ae858ac-1a5b-43d2-9c3f-1bf2d06d427e" providerId="ADAL" clId="{2B702FFD-AF59-4837-A895-A83D32041250}" dt="2022-10-18T18:18:26.489" v="2" actId="14100"/>
+          <ac:spMkLst>
+            <pc:docMk/>
+            <pc:sldMk cId="199476424" sldId="431"/>
+            <ac:spMk id="10" creationId="{C1ABFADE-C8F9-4B2D-ACAE-51AFFF9D31D9}"/>
+          </ac:spMkLst>
+        </pc:spChg>
+      </pc:sldChg>
+      <pc:sldChg chg="modSp mod">
+        <pc:chgData name="Brent Pulmans" userId="8ae858ac-1a5b-43d2-9c3f-1bf2d06d427e" providerId="ADAL" clId="{2B702FFD-AF59-4837-A895-A83D32041250}" dt="2022-10-18T18:20:18.531" v="3" actId="20577"/>
+        <pc:sldMkLst>
+          <pc:docMk/>
+          <pc:sldMk cId="3784660503" sldId="432"/>
+        </pc:sldMkLst>
+        <pc:spChg chg="mod">
+          <ac:chgData name="Brent Pulmans" userId="8ae858ac-1a5b-43d2-9c3f-1bf2d06d427e" providerId="ADAL" clId="{2B702FFD-AF59-4837-A895-A83D32041250}" dt="2022-10-18T18:20:18.531" v="3" actId="20577"/>
+          <ac:spMkLst>
+            <pc:docMk/>
+            <pc:sldMk cId="3784660503" sldId="432"/>
+            <ac:spMk id="9" creationId="{F5EEF705-D80B-46BE-8E56-E74B2BB14F61}"/>
+          </ac:spMkLst>
+        </pc:spChg>
+      </pc:sldChg>
+      <pc:sldChg chg="modSp mod">
+        <pc:chgData name="Brent Pulmans" userId="8ae858ac-1a5b-43d2-9c3f-1bf2d06d427e" providerId="ADAL" clId="{2B702FFD-AF59-4837-A895-A83D32041250}" dt="2022-10-18T18:43:47.882" v="4" actId="207"/>
+        <pc:sldMkLst>
+          <pc:docMk/>
+          <pc:sldMk cId="2370008380" sldId="438"/>
+        </pc:sldMkLst>
+        <pc:spChg chg="mod">
+          <ac:chgData name="Brent Pulmans" userId="8ae858ac-1a5b-43d2-9c3f-1bf2d06d427e" providerId="ADAL" clId="{2B702FFD-AF59-4837-A895-A83D32041250}" dt="2022-10-18T18:43:47.882" v="4" actId="207"/>
+          <ac:spMkLst>
+            <pc:docMk/>
+            <pc:sldMk cId="2370008380" sldId="438"/>
+            <ac:spMk id="3" creationId="{871EE792-DD4C-41F8-A742-EC49590280FD}"/>
+          </ac:spMkLst>
+        </pc:spChg>
+      </pc:sldChg>
     </pc:docChg>
   </pc:docChgLst>
   <pc:docChgLst>
@@ -775,7 +866,7 @@
           <a:p>
             <a:fld id="{4D53584B-980D-4F7D-BA36-682FCDF648BB}" type="datetimeFigureOut">
               <a:rPr lang="nl-BE" smtClean="0"/>
-              <a:t>25/05/2022</a:t>
+              <a:t>18/10/2022</a:t>
             </a:fld>
             <a:endParaRPr lang="nl-BE"/>
           </a:p>
@@ -1276,7 +1367,7 @@
           <a:p>
             <a:fld id="{9DBA54DB-1B16-4AD1-A9F9-560BFE3100B9}" type="datetime1">
               <a:rPr lang="nl-BE" smtClean="0"/>
-              <a:t>25/05/2022</a:t>
+              <a:t>18/10/2022</a:t>
             </a:fld>
             <a:endParaRPr lang="nl-BE"/>
           </a:p>
@@ -1528,7 +1619,7 @@
           <a:p>
             <a:fld id="{7BE4DD14-A5A2-4EBE-8108-B4151B97AFA3}" type="datetime1">
               <a:rPr lang="nl-BE" smtClean="0"/>
-              <a:t>25/05/2022</a:t>
+              <a:t>18/10/2022</a:t>
             </a:fld>
             <a:endParaRPr lang="nl-BE"/>
           </a:p>
@@ -1708,7 +1799,7 @@
           <a:p>
             <a:fld id="{3FD6D2C0-23FD-48D4-8694-5C8CCB26DE5B}" type="datetime1">
               <a:rPr lang="nl-BE" smtClean="0"/>
-              <a:t>25/05/2022</a:t>
+              <a:t>18/10/2022</a:t>
             </a:fld>
             <a:endParaRPr lang="nl-BE"/>
           </a:p>
@@ -1907,7 +1998,7 @@
           <a:p>
             <a:fld id="{7F502A1D-A910-4100-B61A-B3604D95ED9D}" type="datetime1">
               <a:rPr lang="nl-BE" smtClean="0"/>
-              <a:t>25/05/2022</a:t>
+              <a:t>18/10/2022</a:t>
             </a:fld>
             <a:endParaRPr lang="nl-BE"/>
           </a:p>
@@ -2158,7 +2249,7 @@
           <a:p>
             <a:fld id="{FC274EC3-A4C1-4AD9-8B7B-E6619E9154A0}" type="datetime1">
               <a:rPr lang="nl-BE" smtClean="0"/>
-              <a:t>25/05/2022</a:t>
+              <a:t>18/10/2022</a:t>
             </a:fld>
             <a:endParaRPr lang="nl-BE"/>
           </a:p>
@@ -2390,7 +2481,7 @@
           <a:p>
             <a:fld id="{19D8E8DE-ADBC-4B34-812D-AE94AC273780}" type="datetime1">
               <a:rPr lang="nl-BE" smtClean="0"/>
-              <a:t>25/05/2022</a:t>
+              <a:t>18/10/2022</a:t>
             </a:fld>
             <a:endParaRPr lang="nl-BE"/>
           </a:p>
@@ -2757,7 +2848,7 @@
           <a:p>
             <a:fld id="{31505BAB-8768-4F28-94D4-0FB2B7E5CAF3}" type="datetime1">
               <a:rPr lang="nl-BE" smtClean="0"/>
-              <a:t>25/05/2022</a:t>
+              <a:t>18/10/2022</a:t>
             </a:fld>
             <a:endParaRPr lang="nl-BE"/>
           </a:p>
@@ -2875,7 +2966,7 @@
           <a:p>
             <a:fld id="{0E166F45-FB20-41E3-B1E4-21B171F68161}" type="datetime1">
               <a:rPr lang="nl-BE" smtClean="0"/>
-              <a:t>25/05/2022</a:t>
+              <a:t>18/10/2022</a:t>
             </a:fld>
             <a:endParaRPr lang="nl-BE"/>
           </a:p>
@@ -2970,7 +3061,7 @@
           <a:p>
             <a:fld id="{0FF58E41-313F-407F-8EC3-61136F94D127}" type="datetime1">
               <a:rPr lang="nl-BE" smtClean="0"/>
-              <a:t>25/05/2022</a:t>
+              <a:t>18/10/2022</a:t>
             </a:fld>
             <a:endParaRPr lang="nl-BE"/>
           </a:p>
@@ -3247,7 +3338,7 @@
           <a:p>
             <a:fld id="{B85B5F37-38DA-4EAB-81BB-622D74C0BD14}" type="datetime1">
               <a:rPr lang="nl-BE" smtClean="0"/>
-              <a:t>25/05/2022</a:t>
+              <a:t>18/10/2022</a:t>
             </a:fld>
             <a:endParaRPr lang="nl-BE"/>
           </a:p>
@@ -3500,7 +3591,7 @@
           <a:p>
             <a:fld id="{AD728687-702D-4DA9-A09E-7D549958D675}" type="datetime1">
               <a:rPr lang="nl-BE" smtClean="0"/>
-              <a:t>25/05/2022</a:t>
+              <a:t>18/10/2022</a:t>
             </a:fld>
             <a:endParaRPr lang="nl-BE"/>
           </a:p>
@@ -3713,7 +3804,7 @@
           <a:p>
             <a:fld id="{99CD3CD4-31DA-4C13-BE74-A8E9DA10F56B}" type="datetime1">
               <a:rPr lang="nl-BE" smtClean="0"/>
-              <a:t>25/05/2022</a:t>
+              <a:t>18/10/2022</a:t>
             </a:fld>
             <a:endParaRPr lang="nl-BE"/>
           </a:p>
@@ -8366,126 +8457,362 @@
           <a:lstStyle/>
           <a:p>
             <a:r>
-              <a:rPr lang="nl-BE"/>
-              <a:t>If we now want to know </a:t>
-            </a:r>
-            <a:r>
-              <a:rPr lang="nl-BE" err="1"/>
+              <a:rPr lang="nl-BE" dirty="0" err="1"/>
+              <a:t>If</a:t>
+            </a:r>
+            <a:r>
+              <a:rPr lang="nl-BE" dirty="0"/>
+              <a:t> we </a:t>
+            </a:r>
+            <a:r>
+              <a:rPr lang="nl-BE" dirty="0" err="1"/>
+              <a:t>now</a:t>
+            </a:r>
+            <a:r>
+              <a:rPr lang="nl-BE" dirty="0"/>
+              <a:t> want </a:t>
+            </a:r>
+            <a:r>
+              <a:rPr lang="nl-BE" dirty="0" err="1"/>
+              <a:t>to</a:t>
+            </a:r>
+            <a:r>
+              <a:rPr lang="nl-BE" dirty="0"/>
+              <a:t> </a:t>
+            </a:r>
+            <a:r>
+              <a:rPr lang="nl-BE" dirty="0" err="1"/>
+              <a:t>know</a:t>
+            </a:r>
+            <a:r>
+              <a:rPr lang="nl-BE" dirty="0"/>
+              <a:t> </a:t>
+            </a:r>
+            <a:r>
+              <a:rPr lang="nl-BE" dirty="0" err="1"/>
               <a:t>the</a:t>
             </a:r>
             <a:r>
-              <a:rPr lang="nl-BE"/>
+              <a:rPr lang="nl-BE" dirty="0"/>
               <a:t> </a:t>
             </a:r>
             <a:r>
-              <a:rPr lang="nl-BE" err="1"/>
+              <a:rPr lang="nl-BE" dirty="0" err="1"/>
               <a:t>frequency</a:t>
             </a:r>
             <a:r>
-              <a:rPr lang="nl-BE"/>
+              <a:rPr lang="nl-BE" dirty="0"/>
               <a:t> of a </a:t>
             </a:r>
             <a:r>
-              <a:rPr lang="nl-BE" err="1"/>
+              <a:rPr lang="nl-BE" dirty="0" err="1"/>
               <a:t>certain</a:t>
             </a:r>
             <a:r>
-              <a:rPr lang="nl-BE"/>
+              <a:rPr lang="nl-BE" dirty="0"/>
               <a:t> </a:t>
             </a:r>
             <a:r>
-              <a:rPr lang="nl-BE" err="1"/>
+              <a:rPr lang="nl-BE" dirty="0" err="1"/>
               <a:t>character</a:t>
             </a:r>
             <a:r>
-              <a:rPr lang="nl-BE"/>
-              <a:t>, we first have to look it up in </a:t>
-            </a:r>
-            <a:r>
-              <a:rPr lang="nl-BE" err="1"/>
+              <a:rPr lang="nl-BE" dirty="0"/>
+              <a:t>, we first have </a:t>
+            </a:r>
+            <a:r>
+              <a:rPr lang="nl-BE" dirty="0" err="1"/>
+              <a:t>to</a:t>
+            </a:r>
+            <a:r>
+              <a:rPr lang="nl-BE" dirty="0"/>
+              <a:t> look </a:t>
+            </a:r>
+            <a:r>
+              <a:rPr lang="nl-BE" dirty="0" err="1"/>
+              <a:t>it</a:t>
+            </a:r>
+            <a:r>
+              <a:rPr lang="nl-BE" dirty="0"/>
+              <a:t> up in </a:t>
+            </a:r>
+            <a:r>
+              <a:rPr lang="nl-BE" dirty="0" err="1"/>
               <a:t>the</a:t>
             </a:r>
             <a:r>
-              <a:rPr lang="nl-BE"/>
+              <a:rPr lang="nl-BE" dirty="0"/>
               <a:t> </a:t>
             </a:r>
             <a:r>
-              <a:rPr lang="nl-BE" err="1"/>
+              <a:rPr lang="nl-BE" dirty="0" err="1"/>
               <a:t>characters</a:t>
             </a:r>
             <a:r>
-              <a:rPr lang="nl-BE"/>
-              <a:t> list in order to know the index position that we have to retrieve in the occurrences list. </a:t>
-            </a:r>
-          </a:p>
-          <a:p>
-            <a:endParaRPr lang="nl-BE"/>
-          </a:p>
-          <a:p>
-            <a:endParaRPr lang="nl-BE"/>
-          </a:p>
-          <a:p>
-            <a:endParaRPr lang="nl-BE"/>
-          </a:p>
-          <a:p>
-            <a:endParaRPr lang="nl-BE"/>
-          </a:p>
-          <a:p>
-            <a:r>
-              <a:rPr lang="nl-BE"/>
-              <a:t>In this situation it would be more convenient to keep </a:t>
-            </a:r>
-            <a:r>
-              <a:rPr lang="nl-BE" err="1"/>
+              <a:rPr lang="nl-BE" dirty="0"/>
+              <a:t> list in order </a:t>
+            </a:r>
+            <a:r>
+              <a:rPr lang="nl-BE" dirty="0" err="1"/>
+              <a:t>to</a:t>
+            </a:r>
+            <a:r>
+              <a:rPr lang="nl-BE" dirty="0"/>
+              <a:t> </a:t>
+            </a:r>
+            <a:r>
+              <a:rPr lang="nl-BE" dirty="0" err="1"/>
+              <a:t>know</a:t>
+            </a:r>
+            <a:r>
+              <a:rPr lang="nl-BE" dirty="0"/>
+              <a:t> </a:t>
+            </a:r>
+            <a:r>
+              <a:rPr lang="nl-BE" dirty="0" err="1"/>
               <a:t>the</a:t>
             </a:r>
             <a:r>
-              <a:rPr lang="nl-BE"/>
+              <a:rPr lang="nl-BE" dirty="0"/>
+              <a:t> index </a:t>
+            </a:r>
+            <a:r>
+              <a:rPr lang="nl-BE" dirty="0" err="1"/>
+              <a:t>position</a:t>
+            </a:r>
+            <a:r>
+              <a:rPr lang="nl-BE" dirty="0"/>
               <a:t> </a:t>
             </a:r>
             <a:r>
-              <a:rPr lang="nl-BE" err="1"/>
+              <a:rPr lang="nl-BE" dirty="0" err="1"/>
+              <a:t>that</a:t>
+            </a:r>
+            <a:r>
+              <a:rPr lang="nl-BE" dirty="0"/>
+              <a:t> we have </a:t>
+            </a:r>
+            <a:r>
+              <a:rPr lang="nl-BE" dirty="0" err="1"/>
+              <a:t>to</a:t>
+            </a:r>
+            <a:r>
+              <a:rPr lang="nl-BE" dirty="0"/>
+              <a:t> </a:t>
+            </a:r>
+            <a:r>
+              <a:rPr lang="nl-BE" dirty="0" err="1"/>
+              <a:t>retrieve</a:t>
+            </a:r>
+            <a:r>
+              <a:rPr lang="nl-BE" dirty="0"/>
+              <a:t> in </a:t>
+            </a:r>
+            <a:r>
+              <a:rPr lang="nl-BE" dirty="0" err="1"/>
+              <a:t>the</a:t>
+            </a:r>
+            <a:r>
+              <a:rPr lang="nl-BE" dirty="0"/>
+              <a:t> </a:t>
+            </a:r>
+            <a:r>
+              <a:rPr lang="nl-BE" dirty="0" err="1"/>
+              <a:t>occurrences</a:t>
+            </a:r>
+            <a:r>
+              <a:rPr lang="nl-BE" dirty="0"/>
+              <a:t> list. </a:t>
+            </a:r>
+          </a:p>
+          <a:p>
+            <a:endParaRPr lang="nl-BE" dirty="0"/>
+          </a:p>
+          <a:p>
+            <a:endParaRPr lang="nl-BE" dirty="0"/>
+          </a:p>
+          <a:p>
+            <a:endParaRPr lang="nl-BE" dirty="0"/>
+          </a:p>
+          <a:p>
+            <a:endParaRPr lang="nl-BE" dirty="0"/>
+          </a:p>
+          <a:p>
+            <a:r>
+              <a:rPr lang="nl-BE" dirty="0"/>
+              <a:t>In </a:t>
+            </a:r>
+            <a:r>
+              <a:rPr lang="nl-BE" dirty="0" err="1"/>
+              <a:t>this</a:t>
+            </a:r>
+            <a:r>
+              <a:rPr lang="nl-BE" dirty="0"/>
+              <a:t> </a:t>
+            </a:r>
+            <a:r>
+              <a:rPr lang="nl-BE" dirty="0" err="1"/>
+              <a:t>situation</a:t>
+            </a:r>
+            <a:r>
+              <a:rPr lang="nl-BE" dirty="0"/>
+              <a:t> </a:t>
+            </a:r>
+            <a:r>
+              <a:rPr lang="nl-BE" dirty="0" err="1"/>
+              <a:t>it</a:t>
+            </a:r>
+            <a:r>
+              <a:rPr lang="nl-BE" dirty="0"/>
+              <a:t> </a:t>
+            </a:r>
+            <a:r>
+              <a:rPr lang="nl-BE" dirty="0" err="1"/>
+              <a:t>would</a:t>
+            </a:r>
+            <a:r>
+              <a:rPr lang="nl-BE" dirty="0"/>
+              <a:t> </a:t>
+            </a:r>
+            <a:r>
+              <a:rPr lang="nl-BE" dirty="0" err="1"/>
+              <a:t>be</a:t>
+            </a:r>
+            <a:r>
+              <a:rPr lang="nl-BE" dirty="0"/>
+              <a:t> more </a:t>
+            </a:r>
+            <a:r>
+              <a:rPr lang="nl-BE" dirty="0" err="1"/>
+              <a:t>convenient</a:t>
+            </a:r>
+            <a:r>
+              <a:rPr lang="nl-BE" dirty="0"/>
+              <a:t> </a:t>
+            </a:r>
+            <a:r>
+              <a:rPr lang="nl-BE" dirty="0" err="1"/>
+              <a:t>to</a:t>
+            </a:r>
+            <a:r>
+              <a:rPr lang="nl-BE" dirty="0"/>
+              <a:t> keep </a:t>
+            </a:r>
+            <a:r>
+              <a:rPr lang="nl-BE" dirty="0" err="1"/>
+              <a:t>the</a:t>
+            </a:r>
+            <a:r>
+              <a:rPr lang="nl-BE" dirty="0"/>
+              <a:t> </a:t>
+            </a:r>
+            <a:r>
+              <a:rPr lang="nl-BE" dirty="0" err="1"/>
               <a:t>characters</a:t>
             </a:r>
             <a:r>
-              <a:rPr lang="nl-BE"/>
-              <a:t> and the number of times they occur together in one data </a:t>
-            </a:r>
-            <a:r>
-              <a:rPr lang="nl-BE" err="1"/>
+              <a:rPr lang="nl-BE" dirty="0"/>
+              <a:t> </a:t>
+            </a:r>
+            <a:r>
+              <a:rPr lang="nl-BE" dirty="0" err="1"/>
+              <a:t>and</a:t>
+            </a:r>
+            <a:r>
+              <a:rPr lang="nl-BE" dirty="0"/>
+              <a:t> </a:t>
+            </a:r>
+            <a:r>
+              <a:rPr lang="nl-BE" dirty="0" err="1"/>
+              <a:t>the</a:t>
+            </a:r>
+            <a:r>
+              <a:rPr lang="nl-BE" dirty="0"/>
+              <a:t> </a:t>
+            </a:r>
+            <a:r>
+              <a:rPr lang="nl-BE" dirty="0" err="1"/>
+              <a:t>number</a:t>
+            </a:r>
+            <a:r>
+              <a:rPr lang="nl-BE" dirty="0"/>
+              <a:t> of </a:t>
+            </a:r>
+            <a:r>
+              <a:rPr lang="nl-BE" dirty="0" err="1"/>
+              <a:t>times</a:t>
+            </a:r>
+            <a:r>
+              <a:rPr lang="nl-BE" dirty="0"/>
+              <a:t> </a:t>
+            </a:r>
+            <a:r>
+              <a:rPr lang="nl-BE" dirty="0" err="1"/>
+              <a:t>they</a:t>
+            </a:r>
+            <a:r>
+              <a:rPr lang="nl-BE" dirty="0"/>
+              <a:t> </a:t>
+            </a:r>
+            <a:r>
+              <a:rPr lang="nl-BE" dirty="0" err="1"/>
+              <a:t>occur</a:t>
+            </a:r>
+            <a:r>
+              <a:rPr lang="nl-BE" dirty="0"/>
+              <a:t> </a:t>
+            </a:r>
+            <a:r>
+              <a:rPr lang="nl-BE" dirty="0" err="1"/>
+              <a:t>together</a:t>
+            </a:r>
+            <a:r>
+              <a:rPr lang="nl-BE" dirty="0"/>
+              <a:t> in </a:t>
+            </a:r>
+            <a:r>
+              <a:rPr lang="nl-BE" dirty="0" err="1"/>
+              <a:t>one</a:t>
+            </a:r>
+            <a:r>
+              <a:rPr lang="nl-BE" dirty="0"/>
+              <a:t> data </a:t>
+            </a:r>
+            <a:r>
+              <a:rPr lang="nl-BE" dirty="0" err="1"/>
               <a:t>structure</a:t>
             </a:r>
             <a:r>
-              <a:rPr lang="nl-BE"/>
+              <a:rPr lang="nl-BE" dirty="0"/>
               <a:t>.</a:t>
             </a:r>
           </a:p>
           <a:p>
             <a:r>
-              <a:rPr lang="nl-BE"/>
+              <a:rPr lang="nl-BE" dirty="0"/>
               <a:t>A </a:t>
             </a:r>
             <a:r>
-              <a:rPr lang="nl-BE" err="1"/>
+              <a:rPr lang="nl-BE" dirty="0" err="1"/>
               <a:t>suitable</a:t>
             </a:r>
             <a:r>
-              <a:rPr lang="nl-BE"/>
+              <a:rPr lang="nl-BE" dirty="0"/>
               <a:t> type of </a:t>
             </a:r>
             <a:r>
-              <a:rPr lang="nl-BE" err="1"/>
+              <a:rPr lang="nl-BE" dirty="0" err="1"/>
               <a:t>structure</a:t>
             </a:r>
             <a:r>
-              <a:rPr lang="nl-BE"/>
+              <a:rPr lang="nl-BE" dirty="0"/>
               <a:t> is a:</a:t>
             </a:r>
           </a:p>
           <a:p>
             <a:pPr lvl="1"/>
             <a:r>
-              <a:rPr lang="nl-BE" err="1">
+              <a:rPr lang="nl-BE" dirty="0" err="1">
                 <a:solidFill>
                   <a:srgbClr val="4584B6"/>
                 </a:solidFill>
@@ -8493,18 +8820,10 @@
               <a:t>dictionary</a:t>
             </a:r>
             <a:r>
-              <a:rPr lang="en-US">
-                <a:solidFill>
-                  <a:srgbClr val="4584B6"/>
-                </a:solidFill>
-              </a:rPr>
-              <a:t>: a </a:t>
-            </a:r>
-            <a:r>
-              <a:rPr lang="en-US"/>
-              <a:t>unique ordered** collection of key-value pairs which is changeable</a:t>
-            </a:r>
-            <a:endParaRPr lang="nl-BE"/>
+              <a:rPr lang="en-US" dirty="0"/>
+              <a:t>: a unique ordered** collection of key-value pairs which is changeable</a:t>
+            </a:r>
+            <a:endParaRPr lang="nl-BE" dirty="0"/>
           </a:p>
         </p:txBody>
       </p:sp>
@@ -8680,43 +8999,43 @@
               </a:spcBef>
             </a:pPr>
             <a:r>
-              <a:rPr lang="nl-NL">
+              <a:rPr lang="nl-NL" dirty="0">
                 <a:latin typeface="Calibri" pitchFamily="34" charset="0"/>
               </a:rPr>
               <a:t>A </a:t>
             </a:r>
             <a:r>
-              <a:rPr lang="nl-NL" err="1">
+              <a:rPr lang="nl-NL" dirty="0" err="1">
                 <a:latin typeface="Calibri" pitchFamily="34" charset="0"/>
               </a:rPr>
               <a:t>dictionary</a:t>
             </a:r>
             <a:r>
-              <a:rPr lang="nl-NL">
+              <a:rPr lang="nl-NL" dirty="0">
                 <a:latin typeface="Calibri" pitchFamily="34" charset="0"/>
               </a:rPr>
               <a:t> is </a:t>
             </a:r>
             <a:r>
-              <a:rPr lang="nl-NL" err="1">
+              <a:rPr lang="nl-NL" dirty="0" err="1">
                 <a:latin typeface="Calibri" pitchFamily="34" charset="0"/>
               </a:rPr>
               <a:t>an</a:t>
             </a:r>
             <a:r>
-              <a:rPr lang="nl-NL">
+              <a:rPr lang="nl-NL" dirty="0">
                 <a:latin typeface="Calibri" pitchFamily="34" charset="0"/>
               </a:rPr>
               <a:t> </a:t>
             </a:r>
             <a:r>
-              <a:rPr lang="nl-NL" err="1">
+              <a:rPr lang="nl-NL" dirty="0" err="1">
                 <a:latin typeface="Calibri" pitchFamily="34" charset="0"/>
               </a:rPr>
-              <a:t>ordered</a:t>
-            </a:r>
-            <a:r>
-              <a:rPr lang="nl-NL">
+              <a:t>unordered</a:t>
+            </a:r>
+            <a:r>
+              <a:rPr lang="nl-NL" dirty="0">
                 <a:solidFill>
                   <a:srgbClr val="00B0F0"/>
                 </a:solidFill>
@@ -8725,31 +9044,43 @@
               <a:t>**</a:t>
             </a:r>
             <a:r>
-              <a:rPr lang="nl-NL">
+              <a:rPr lang="nl-NL" dirty="0">
                 <a:latin typeface="Calibri" pitchFamily="34" charset="0"/>
               </a:rPr>
-              <a:t>, changeable </a:t>
-            </a:r>
-            <a:r>
-              <a:rPr lang="nl-NL" err="1">
+              <a:t>, </a:t>
+            </a:r>
+            <a:r>
+              <a:rPr lang="nl-NL" dirty="0" err="1">
                 <a:latin typeface="Calibri" pitchFamily="34" charset="0"/>
               </a:rPr>
+              <a:t>changeable</a:t>
+            </a:r>
+            <a:r>
+              <a:rPr lang="nl-NL" dirty="0">
+                <a:latin typeface="Calibri" pitchFamily="34" charset="0"/>
+              </a:rPr>
+              <a:t> </a:t>
+            </a:r>
+            <a:r>
+              <a:rPr lang="nl-NL" dirty="0" err="1">
+                <a:latin typeface="Calibri" pitchFamily="34" charset="0"/>
+              </a:rPr>
               <a:t>collection</a:t>
             </a:r>
             <a:r>
-              <a:rPr lang="nl-NL">
+              <a:rPr lang="nl-NL" dirty="0">
                 <a:latin typeface="Calibri" pitchFamily="34" charset="0"/>
               </a:rPr>
               <a:t> of </a:t>
             </a:r>
             <a:r>
-              <a:rPr lang="nl-NL" err="1">
+              <a:rPr lang="nl-NL" dirty="0" err="1">
                 <a:latin typeface="Calibri" pitchFamily="34" charset="0"/>
               </a:rPr>
               <a:t>key-value</a:t>
             </a:r>
             <a:r>
-              <a:rPr lang="nl-NL">
+              <a:rPr lang="nl-NL" dirty="0">
                 <a:latin typeface="Calibri" pitchFamily="34" charset="0"/>
               </a:rPr>
               <a:t> pairs </a:t>
@@ -8760,13 +9091,13 @@
               <a:buNone/>
             </a:pPr>
             <a:r>
-              <a:rPr lang="nl-NL" sz="1600">
+              <a:rPr lang="nl-NL" sz="1600" dirty="0">
                 <a:latin typeface="Calibri" pitchFamily="34" charset="0"/>
               </a:rPr>
               <a:t>			(</a:t>
             </a:r>
             <a:r>
-              <a:rPr lang="nl-NL" sz="1600">
+              <a:rPr lang="nl-NL" sz="1600" dirty="0">
                 <a:solidFill>
                   <a:srgbClr val="00B0F0"/>
                 </a:solidFill>
@@ -8775,7 +9106,7 @@
               <a:t>** </a:t>
             </a:r>
             <a:r>
-              <a:rPr lang="nl-NL" sz="1600" err="1">
+              <a:rPr lang="nl-NL" sz="1600" dirty="0" err="1">
                 <a:solidFill>
                   <a:srgbClr val="00B0F0"/>
                 </a:solidFill>
@@ -8784,7 +9115,7 @@
               <a:t>from</a:t>
             </a:r>
             <a:r>
-              <a:rPr lang="nl-NL" sz="1600">
+              <a:rPr lang="nl-NL" sz="1600" dirty="0">
                 <a:solidFill>
                   <a:srgbClr val="00B0F0"/>
                 </a:solidFill>
@@ -8793,7 +9124,7 @@
               <a:t> Python 3.7 </a:t>
             </a:r>
             <a:r>
-              <a:rPr lang="nl-NL" sz="1600" err="1">
+              <a:rPr lang="nl-NL" sz="1600" dirty="0" err="1">
                 <a:solidFill>
                   <a:srgbClr val="00B0F0"/>
                 </a:solidFill>
@@ -8802,7 +9133,7 @@
               <a:t>onwards</a:t>
             </a:r>
             <a:r>
-              <a:rPr lang="nl-NL" sz="1600">
+              <a:rPr lang="nl-NL" sz="1600" dirty="0">
                 <a:latin typeface="Calibri" pitchFamily="34" charset="0"/>
               </a:rPr>
               <a:t>)</a:t>
@@ -8815,30 +9146,138 @@
               </a:spcBef>
             </a:pPr>
             <a:r>
-              <a:rPr lang="nl-NL">
+              <a:rPr lang="nl-NL" dirty="0">
                 <a:latin typeface="Calibri" pitchFamily="34" charset="0"/>
               </a:rPr>
-              <a:t>The key is unique so you can use it to retrieve </a:t>
-            </a:r>
-            <a:r>
-              <a:rPr lang="nl-NL" err="1">
+              <a:t>The </a:t>
+            </a:r>
+            <a:r>
+              <a:rPr lang="nl-NL" dirty="0" err="1">
                 <a:latin typeface="Calibri" pitchFamily="34" charset="0"/>
               </a:rPr>
+              <a:t>key</a:t>
+            </a:r>
+            <a:r>
+              <a:rPr lang="nl-NL" dirty="0">
+                <a:latin typeface="Calibri" pitchFamily="34" charset="0"/>
+              </a:rPr>
+              <a:t> is </a:t>
+            </a:r>
+            <a:r>
+              <a:rPr lang="nl-NL" dirty="0" err="1">
+                <a:latin typeface="Calibri" pitchFamily="34" charset="0"/>
+              </a:rPr>
+              <a:t>unique</a:t>
+            </a:r>
+            <a:r>
+              <a:rPr lang="nl-NL" dirty="0">
+                <a:latin typeface="Calibri" pitchFamily="34" charset="0"/>
+              </a:rPr>
+              <a:t> </a:t>
+            </a:r>
+            <a:r>
+              <a:rPr lang="nl-NL" dirty="0" err="1">
+                <a:latin typeface="Calibri" pitchFamily="34" charset="0"/>
+              </a:rPr>
+              <a:t>so</a:t>
+            </a:r>
+            <a:r>
+              <a:rPr lang="nl-NL" dirty="0">
+                <a:latin typeface="Calibri" pitchFamily="34" charset="0"/>
+              </a:rPr>
+              <a:t> </a:t>
+            </a:r>
+            <a:r>
+              <a:rPr lang="nl-NL" dirty="0" err="1">
+                <a:latin typeface="Calibri" pitchFamily="34" charset="0"/>
+              </a:rPr>
+              <a:t>you</a:t>
+            </a:r>
+            <a:r>
+              <a:rPr lang="nl-NL" dirty="0">
+                <a:latin typeface="Calibri" pitchFamily="34" charset="0"/>
+              </a:rPr>
+              <a:t> </a:t>
+            </a:r>
+            <a:r>
+              <a:rPr lang="nl-NL" dirty="0" err="1">
+                <a:latin typeface="Calibri" pitchFamily="34" charset="0"/>
+              </a:rPr>
+              <a:t>can</a:t>
+            </a:r>
+            <a:r>
+              <a:rPr lang="nl-NL" dirty="0">
+                <a:latin typeface="Calibri" pitchFamily="34" charset="0"/>
+              </a:rPr>
+              <a:t> </a:t>
+            </a:r>
+            <a:r>
+              <a:rPr lang="nl-NL" dirty="0" err="1">
+                <a:latin typeface="Calibri" pitchFamily="34" charset="0"/>
+              </a:rPr>
+              <a:t>use</a:t>
+            </a:r>
+            <a:r>
+              <a:rPr lang="nl-NL" dirty="0">
+                <a:latin typeface="Calibri" pitchFamily="34" charset="0"/>
+              </a:rPr>
+              <a:t> </a:t>
+            </a:r>
+            <a:r>
+              <a:rPr lang="nl-NL" dirty="0" err="1">
+                <a:latin typeface="Calibri" pitchFamily="34" charset="0"/>
+              </a:rPr>
+              <a:t>it</a:t>
+            </a:r>
+            <a:r>
+              <a:rPr lang="nl-NL" dirty="0">
+                <a:latin typeface="Calibri" pitchFamily="34" charset="0"/>
+              </a:rPr>
+              <a:t> </a:t>
+            </a:r>
+            <a:r>
+              <a:rPr lang="nl-NL" dirty="0" err="1">
+                <a:latin typeface="Calibri" pitchFamily="34" charset="0"/>
+              </a:rPr>
+              <a:t>to</a:t>
+            </a:r>
+            <a:r>
+              <a:rPr lang="nl-NL" dirty="0">
+                <a:latin typeface="Calibri" pitchFamily="34" charset="0"/>
+              </a:rPr>
+              <a:t> </a:t>
+            </a:r>
+            <a:r>
+              <a:rPr lang="nl-NL" dirty="0" err="1">
+                <a:latin typeface="Calibri" pitchFamily="34" charset="0"/>
+              </a:rPr>
+              <a:t>retrieve</a:t>
+            </a:r>
+            <a:r>
+              <a:rPr lang="nl-NL" dirty="0">
+                <a:latin typeface="Calibri" pitchFamily="34" charset="0"/>
+              </a:rPr>
+              <a:t> </a:t>
+            </a:r>
+            <a:r>
+              <a:rPr lang="nl-NL" dirty="0" err="1">
+                <a:latin typeface="Calibri" pitchFamily="34" charset="0"/>
+              </a:rPr>
               <a:t>any</a:t>
             </a:r>
             <a:r>
-              <a:rPr lang="nl-NL">
+              <a:rPr lang="nl-NL" dirty="0">
                 <a:latin typeface="Calibri" pitchFamily="34" charset="0"/>
               </a:rPr>
               <a:t> </a:t>
             </a:r>
             <a:r>
-              <a:rPr lang="nl-NL" err="1">
+              <a:rPr lang="nl-NL" dirty="0" err="1">
                 <a:latin typeface="Calibri" pitchFamily="34" charset="0"/>
               </a:rPr>
               <a:t>value</a:t>
             </a:r>
-            <a:endParaRPr lang="nl-NL">
+            <a:endParaRPr lang="nl-NL" dirty="0">
               <a:latin typeface="Calibri" pitchFamily="34" charset="0"/>
             </a:endParaRPr>
           </a:p>
@@ -8849,24 +9288,90 @@
               </a:spcBef>
             </a:pPr>
             <a:r>
-              <a:rPr lang="nl-NL">
+              <a:rPr lang="nl-NL" dirty="0" err="1">
                 <a:latin typeface="Calibri" pitchFamily="34" charset="0"/>
               </a:rPr>
-              <a:t>You can imagine a </a:t>
-            </a:r>
-            <a:r>
-              <a:rPr lang="nl-NL" err="1">
+              <a:t>You</a:t>
+            </a:r>
+            <a:r>
+              <a:rPr lang="nl-NL" dirty="0">
                 <a:latin typeface="Calibri" pitchFamily="34" charset="0"/>
               </a:rPr>
+              <a:t> </a:t>
+            </a:r>
+            <a:r>
+              <a:rPr lang="nl-NL" dirty="0" err="1">
+                <a:latin typeface="Calibri" pitchFamily="34" charset="0"/>
+              </a:rPr>
+              <a:t>can</a:t>
+            </a:r>
+            <a:r>
+              <a:rPr lang="nl-NL" dirty="0">
+                <a:latin typeface="Calibri" pitchFamily="34" charset="0"/>
+              </a:rPr>
+              <a:t> </a:t>
+            </a:r>
+            <a:r>
+              <a:rPr lang="nl-NL" dirty="0" err="1">
+                <a:latin typeface="Calibri" pitchFamily="34" charset="0"/>
+              </a:rPr>
+              <a:t>imagine</a:t>
+            </a:r>
+            <a:r>
+              <a:rPr lang="nl-NL" dirty="0">
+                <a:latin typeface="Calibri" pitchFamily="34" charset="0"/>
+              </a:rPr>
+              <a:t> a </a:t>
+            </a:r>
+            <a:r>
+              <a:rPr lang="nl-NL" dirty="0" err="1">
+                <a:latin typeface="Calibri" pitchFamily="34" charset="0"/>
+              </a:rPr>
               <a:t>dictionary</a:t>
             </a:r>
             <a:r>
-              <a:rPr lang="nl-NL">
+              <a:rPr lang="nl-NL" dirty="0">
                 <a:latin typeface="Calibri" pitchFamily="34" charset="0"/>
               </a:rPr>
-              <a:t> as a table with two columns</a:t>
-            </a:r>
-            <a:endParaRPr lang="en-US">
+              <a:t> as a </a:t>
+            </a:r>
+            <a:r>
+              <a:rPr lang="nl-NL" dirty="0" err="1">
+                <a:latin typeface="Calibri" pitchFamily="34" charset="0"/>
+              </a:rPr>
+              <a:t>table</a:t>
+            </a:r>
+            <a:r>
+              <a:rPr lang="nl-NL" dirty="0">
+                <a:latin typeface="Calibri" pitchFamily="34" charset="0"/>
+              </a:rPr>
+              <a:t> </a:t>
+            </a:r>
+            <a:r>
+              <a:rPr lang="nl-NL" dirty="0" err="1">
+                <a:latin typeface="Calibri" pitchFamily="34" charset="0"/>
+              </a:rPr>
+              <a:t>with</a:t>
+            </a:r>
+            <a:r>
+              <a:rPr lang="nl-NL" dirty="0">
+                <a:latin typeface="Calibri" pitchFamily="34" charset="0"/>
+              </a:rPr>
+              <a:t> </a:t>
+            </a:r>
+            <a:r>
+              <a:rPr lang="nl-NL" dirty="0" err="1">
+                <a:latin typeface="Calibri" pitchFamily="34" charset="0"/>
+              </a:rPr>
+              <a:t>two</a:t>
+            </a:r>
+            <a:r>
+              <a:rPr lang="nl-NL" dirty="0">
+                <a:latin typeface="Calibri" pitchFamily="34" charset="0"/>
+              </a:rPr>
+              <a:t> columns</a:t>
+            </a:r>
+            <a:endParaRPr lang="en-US" dirty="0">
               <a:latin typeface="Calibri" pitchFamily="34" charset="0"/>
             </a:endParaRPr>
           </a:p>
@@ -8876,7 +9381,7 @@
                 <a:spcPts val="500"/>
               </a:spcBef>
             </a:pPr>
-            <a:endParaRPr lang="nl-NL">
+            <a:endParaRPr lang="nl-NL" dirty="0">
               <a:latin typeface="Calibri" pitchFamily="34" charset="0"/>
             </a:endParaRPr>
           </a:p>
@@ -8887,7 +9392,7 @@
               </a:spcBef>
               <a:buNone/>
             </a:pPr>
-            <a:endParaRPr lang="nl-NL">
+            <a:endParaRPr lang="nl-NL" dirty="0">
               <a:latin typeface="Calibri" pitchFamily="34" charset="0"/>
             </a:endParaRPr>
           </a:p>
@@ -8895,7 +9400,7 @@
             <a:pPr marL="0" indent="0">
               <a:buNone/>
             </a:pPr>
-            <a:endParaRPr lang="nl-BE"/>
+            <a:endParaRPr lang="nl-BE" dirty="0"/>
           </a:p>
         </p:txBody>
       </p:sp>
@@ -16683,251 +17188,219 @@
           <a:lstStyle/>
           <a:p>
             <a:r>
-              <a:rPr lang="nl-BE" err="1"/>
+              <a:rPr lang="nl-BE" dirty="0" err="1"/>
               <a:t>By</a:t>
             </a:r>
             <a:r>
-              <a:rPr lang="nl-BE"/>
+              <a:rPr lang="nl-BE" dirty="0"/>
               <a:t> </a:t>
             </a:r>
             <a:r>
-              <a:rPr lang="nl-BE" err="1"/>
+              <a:rPr lang="nl-BE" dirty="0" err="1"/>
               <a:t>definition</a:t>
             </a:r>
             <a:r>
-              <a:rPr lang="nl-BE"/>
+              <a:rPr lang="nl-BE" dirty="0"/>
               <a:t>, a </a:t>
             </a:r>
             <a:r>
-              <a:rPr lang="nl-BE" err="1"/>
+              <a:rPr lang="nl-BE" dirty="0" err="1"/>
               <a:t>dictionary</a:t>
             </a:r>
             <a:r>
-              <a:rPr lang="nl-BE"/>
+              <a:rPr lang="nl-BE" dirty="0"/>
               <a:t> is a </a:t>
             </a:r>
             <a:r>
-              <a:rPr lang="nl-BE" err="1"/>
+              <a:rPr lang="nl-BE" dirty="0" err="1"/>
               <a:t>collection</a:t>
             </a:r>
             <a:r>
-              <a:rPr lang="nl-BE"/>
+              <a:rPr lang="nl-BE" dirty="0"/>
               <a:t> of </a:t>
             </a:r>
             <a:r>
-              <a:rPr lang="nl-BE">
+              <a:rPr lang="nl-BE" dirty="0" err="1">
                 <a:solidFill>
                   <a:srgbClr val="FF0000"/>
                 </a:solidFill>
               </a:rPr>
-              <a:t>(</a:t>
-            </a:r>
-            <a:r>
-              <a:rPr lang="nl-BE" err="1">
+              <a:t>unordered</a:t>
+            </a:r>
+            <a:r>
+              <a:rPr lang="nl-BE" dirty="0"/>
+              <a:t> </a:t>
+            </a:r>
+            <a:r>
+              <a:rPr lang="nl-BE" dirty="0" err="1"/>
+              <a:t>key-value</a:t>
+            </a:r>
+            <a:r>
+              <a:rPr lang="nl-BE" dirty="0"/>
+              <a:t> pairs. </a:t>
+            </a:r>
+          </a:p>
+          <a:p>
+            <a:r>
+              <a:rPr lang="nl-BE" dirty="0" err="1"/>
+              <a:t>There</a:t>
+            </a:r>
+            <a:r>
+              <a:rPr lang="nl-BE" dirty="0"/>
+              <a:t> is </a:t>
+            </a:r>
+            <a:r>
+              <a:rPr lang="nl-BE" u="sng" dirty="0"/>
+              <a:t>no</a:t>
+            </a:r>
+            <a:r>
+              <a:rPr lang="nl-BE" dirty="0"/>
+              <a:t> </a:t>
+            </a:r>
+            <a:r>
+              <a:rPr lang="nl-BE" dirty="0" err="1"/>
+              <a:t>method</a:t>
+            </a:r>
+            <a:r>
+              <a:rPr lang="nl-BE" dirty="0"/>
+              <a:t> </a:t>
+            </a:r>
+            <a:r>
+              <a:rPr lang="nl-BE" dirty="0" err="1"/>
+              <a:t>to</a:t>
+            </a:r>
+            <a:r>
+              <a:rPr lang="nl-BE" dirty="0"/>
+              <a:t> </a:t>
+            </a:r>
+            <a:r>
+              <a:rPr lang="nl-BE" dirty="0" err="1"/>
+              <a:t>sort</a:t>
+            </a:r>
+            <a:r>
+              <a:rPr lang="nl-BE" dirty="0"/>
+              <a:t> </a:t>
+            </a:r>
+            <a:r>
+              <a:rPr lang="nl-BE" dirty="0" err="1"/>
+              <a:t>the</a:t>
+            </a:r>
+            <a:r>
+              <a:rPr lang="nl-BE" dirty="0"/>
+              <a:t> pairs </a:t>
+            </a:r>
+            <a:r>
+              <a:rPr lang="nl-BE" dirty="0" err="1"/>
+              <a:t>internally</a:t>
+            </a:r>
+            <a:r>
+              <a:rPr lang="nl-BE" dirty="0"/>
+              <a:t>.</a:t>
+            </a:r>
+          </a:p>
+          <a:p>
+            <a:r>
+              <a:rPr lang="nl-BE" dirty="0" err="1"/>
+              <a:t>With</a:t>
+            </a:r>
+            <a:r>
+              <a:rPr lang="nl-BE" dirty="0"/>
+              <a:t> </a:t>
+            </a:r>
+            <a:r>
+              <a:rPr lang="nl-BE" dirty="0" err="1"/>
+              <a:t>the</a:t>
+            </a:r>
+            <a:r>
+              <a:rPr lang="nl-BE" dirty="0"/>
+              <a:t> help of </a:t>
+            </a:r>
+            <a:r>
+              <a:rPr lang="nl-BE" dirty="0" err="1"/>
+              <a:t>the</a:t>
+            </a:r>
+            <a:r>
+              <a:rPr lang="nl-BE" dirty="0"/>
+              <a:t> </a:t>
+            </a:r>
+            <a:r>
+              <a:rPr lang="nl-BE" dirty="0" err="1"/>
+              <a:t>sorted</a:t>
+            </a:r>
+            <a:r>
+              <a:rPr lang="nl-BE" dirty="0"/>
+              <a:t>() </a:t>
+            </a:r>
+            <a:r>
+              <a:rPr lang="nl-BE" dirty="0" err="1"/>
+              <a:t>function</a:t>
+            </a:r>
+            <a:r>
+              <a:rPr lang="nl-BE" dirty="0"/>
+              <a:t> </a:t>
+            </a:r>
+            <a:r>
+              <a:rPr lang="nl-BE" dirty="0" err="1"/>
+              <a:t>you</a:t>
+            </a:r>
+            <a:r>
+              <a:rPr lang="nl-BE" dirty="0"/>
+              <a:t> </a:t>
+            </a:r>
+            <a:r>
+              <a:rPr lang="nl-BE" dirty="0" err="1"/>
+              <a:t>can</a:t>
+            </a:r>
+            <a:r>
+              <a:rPr lang="nl-BE" dirty="0"/>
+              <a:t> </a:t>
+            </a:r>
+            <a:r>
+              <a:rPr lang="nl-BE" dirty="0">
                 <a:solidFill>
                   <a:srgbClr val="FF0000"/>
                 </a:solidFill>
               </a:rPr>
-              <a:t>un</a:t>
-            </a:r>
-            <a:r>
-              <a:rPr lang="nl-BE">
+              <a:t>show </a:t>
+            </a:r>
+            <a:r>
+              <a:rPr lang="nl-BE" dirty="0" err="1">
                 <a:solidFill>
                   <a:srgbClr val="FF0000"/>
                 </a:solidFill>
               </a:rPr>
-              <a:t>)</a:t>
-            </a:r>
-            <a:r>
-              <a:rPr lang="nl-BE" err="1">
+              <a:t>the</a:t>
+            </a:r>
+            <a:r>
+              <a:rPr lang="nl-BE" dirty="0">
                 <a:solidFill>
                   <a:srgbClr val="FF0000"/>
                 </a:solidFill>
               </a:rPr>
-              <a:t>ordered</a:t>
-            </a:r>
-            <a:r>
-              <a:rPr lang="nl-BE">
+              <a:t> pairs </a:t>
+            </a:r>
+            <a:r>
+              <a:rPr lang="nl-BE" dirty="0" err="1">
                 <a:solidFill>
                   <a:srgbClr val="FF0000"/>
                 </a:solidFill>
               </a:rPr>
-              <a:t>**</a:t>
-            </a:r>
-            <a:r>
-              <a:rPr lang="nl-BE"/>
-              <a:t> </a:t>
-            </a:r>
-            <a:r>
-              <a:rPr lang="nl-BE" err="1"/>
-              <a:t>key-value</a:t>
-            </a:r>
-            <a:r>
-              <a:rPr lang="nl-BE"/>
-              <a:t> pairs. </a:t>
-            </a:r>
-          </a:p>
-          <a:p>
-            <a:r>
-              <a:rPr lang="nl-BE" err="1"/>
-              <a:t>There</a:t>
-            </a:r>
-            <a:r>
-              <a:rPr lang="nl-BE"/>
-              <a:t> is </a:t>
-            </a:r>
-            <a:r>
-              <a:rPr lang="nl-BE" u="sng"/>
-              <a:t>no</a:t>
-            </a:r>
-            <a:r>
-              <a:rPr lang="nl-BE"/>
-              <a:t> </a:t>
-            </a:r>
-            <a:r>
-              <a:rPr lang="nl-BE" err="1"/>
-              <a:t>method</a:t>
-            </a:r>
-            <a:r>
-              <a:rPr lang="nl-BE"/>
-              <a:t> </a:t>
-            </a:r>
-            <a:r>
-              <a:rPr lang="nl-BE" err="1"/>
-              <a:t>to</a:t>
-            </a:r>
-            <a:r>
-              <a:rPr lang="nl-BE"/>
-              <a:t> </a:t>
-            </a:r>
-            <a:r>
-              <a:rPr lang="nl-BE" err="1"/>
-              <a:t>sort</a:t>
-            </a:r>
-            <a:r>
-              <a:rPr lang="nl-BE"/>
-              <a:t> </a:t>
-            </a:r>
-            <a:r>
-              <a:rPr lang="nl-BE" err="1"/>
-              <a:t>the</a:t>
-            </a:r>
-            <a:r>
-              <a:rPr lang="nl-BE"/>
-              <a:t> pairs </a:t>
-            </a:r>
-            <a:r>
-              <a:rPr lang="nl-BE" err="1"/>
-              <a:t>internally</a:t>
-            </a:r>
-            <a:r>
-              <a:rPr lang="nl-BE"/>
-              <a:t>.</a:t>
-            </a:r>
-          </a:p>
-          <a:p>
-            <a:r>
-              <a:rPr lang="nl-BE" err="1"/>
-              <a:t>With</a:t>
-            </a:r>
-            <a:r>
-              <a:rPr lang="nl-BE"/>
-              <a:t> </a:t>
-            </a:r>
-            <a:r>
-              <a:rPr lang="nl-BE" err="1"/>
-              <a:t>the</a:t>
-            </a:r>
-            <a:r>
-              <a:rPr lang="nl-BE"/>
-              <a:t> help of </a:t>
-            </a:r>
-            <a:r>
-              <a:rPr lang="nl-BE" err="1"/>
-              <a:t>the</a:t>
-            </a:r>
-            <a:r>
-              <a:rPr lang="nl-BE"/>
-              <a:t> </a:t>
-            </a:r>
-            <a:r>
-              <a:rPr lang="nl-BE" err="1"/>
               <a:t>sorted</a:t>
             </a:r>
-            <a:r>
-              <a:rPr lang="nl-BE"/>
-              <a:t>() </a:t>
-            </a:r>
-            <a:r>
-              <a:rPr lang="nl-BE" err="1"/>
-              <a:t>function</a:t>
-            </a:r>
-            <a:r>
-              <a:rPr lang="nl-BE"/>
-              <a:t> </a:t>
-            </a:r>
-            <a:r>
-              <a:rPr lang="nl-BE" err="1"/>
-              <a:t>you</a:t>
-            </a:r>
-            <a:r>
-              <a:rPr lang="nl-BE"/>
-              <a:t> </a:t>
-            </a:r>
-            <a:r>
-              <a:rPr lang="nl-BE" err="1"/>
-              <a:t>can</a:t>
-            </a:r>
-            <a:r>
-              <a:rPr lang="nl-BE"/>
-              <a:t> </a:t>
-            </a:r>
-            <a:r>
-              <a:rPr lang="nl-BE">
-                <a:solidFill>
-                  <a:srgbClr val="FF0000"/>
-                </a:solidFill>
-              </a:rPr>
-              <a:t>show </a:t>
-            </a:r>
-            <a:r>
-              <a:rPr lang="nl-BE" err="1">
-                <a:solidFill>
-                  <a:srgbClr val="FF0000"/>
-                </a:solidFill>
-              </a:rPr>
-              <a:t>the</a:t>
-            </a:r>
-            <a:r>
-              <a:rPr lang="nl-BE">
-                <a:solidFill>
-                  <a:srgbClr val="FF0000"/>
-                </a:solidFill>
-              </a:rPr>
-              <a:t> pairs </a:t>
-            </a:r>
-            <a:r>
-              <a:rPr lang="nl-BE" err="1">
-                <a:solidFill>
-                  <a:srgbClr val="FF0000"/>
-                </a:solidFill>
-              </a:rPr>
-              <a:t>sorted</a:t>
-            </a:r>
-            <a:endParaRPr lang="nl-BE">
+            <a:endParaRPr lang="nl-BE" dirty="0">
               <a:solidFill>
                 <a:srgbClr val="FF0000"/>
               </a:solidFill>
             </a:endParaRPr>
           </a:p>
           <a:p>
-            <a:endParaRPr lang="nl-BE"/>
+            <a:endParaRPr lang="nl-BE" dirty="0"/>
           </a:p>
           <a:p>
             <a:pPr marL="0" indent="0">
               <a:buNone/>
             </a:pPr>
-            <a:endParaRPr lang="nl-BE"/>
+            <a:endParaRPr lang="nl-BE" dirty="0"/>
           </a:p>
         </p:txBody>
       </p:sp>
@@ -18363,13 +18836,13 @@
           <a:lstStyle/>
           <a:p>
             <a:r>
-              <a:rPr lang="nl-BE" altLang="nl-BE">
+              <a:rPr lang="nl-BE" altLang="nl-BE" dirty="0">
                 <a:ea typeface="MS Mincho" pitchFamily="49" charset="-128"/>
               </a:rPr>
               <a:t>A </a:t>
             </a:r>
             <a:r>
-              <a:rPr lang="nl-BE" altLang="nl-BE">
+              <a:rPr lang="nl-BE" altLang="nl-BE" dirty="0">
                 <a:solidFill>
                   <a:srgbClr val="4584B6"/>
                 </a:solidFill>
@@ -18378,138 +18851,357 @@
               <a:t>set</a:t>
             </a:r>
             <a:r>
-              <a:rPr lang="nl-BE" altLang="nl-BE">
+              <a:rPr lang="nl-BE" altLang="nl-BE" dirty="0">
                 <a:ea typeface="MS Mincho" pitchFamily="49" charset="-128"/>
               </a:rPr>
               <a:t> is a </a:t>
             </a:r>
             <a:r>
-              <a:rPr lang="nl-BE" altLang="nl-BE" err="1">
+              <a:rPr lang="nl-BE" altLang="nl-BE" dirty="0" err="1">
                 <a:ea typeface="MS Mincho" pitchFamily="49" charset="-128"/>
               </a:rPr>
               <a:t>collection</a:t>
             </a:r>
             <a:r>
-              <a:rPr lang="nl-BE" altLang="nl-BE">
+              <a:rPr lang="nl-BE" altLang="nl-BE" dirty="0">
                 <a:ea typeface="MS Mincho" pitchFamily="49" charset="-128"/>
               </a:rPr>
               <a:t> </a:t>
             </a:r>
             <a:r>
-              <a:rPr lang="nl-BE" altLang="nl-BE" err="1">
+              <a:rPr lang="nl-BE" altLang="nl-BE" dirty="0" err="1">
                 <a:ea typeface="MS Mincho" pitchFamily="49" charset="-128"/>
               </a:rPr>
               <a:t>unique</a:t>
             </a:r>
             <a:r>
-              <a:rPr lang="nl-BE" altLang="nl-BE">
+              <a:rPr lang="nl-BE" altLang="nl-BE" dirty="0">
                 <a:ea typeface="MS Mincho" pitchFamily="49" charset="-128"/>
               </a:rPr>
               <a:t> </a:t>
             </a:r>
             <a:r>
-              <a:rPr lang="nl-BE" altLang="nl-BE" err="1">
+              <a:rPr lang="nl-BE" altLang="nl-BE" dirty="0" err="1">
                 <a:ea typeface="MS Mincho" pitchFamily="49" charset="-128"/>
               </a:rPr>
               <a:t>elements</a:t>
             </a:r>
             <a:r>
-              <a:rPr lang="nl-BE" altLang="nl-BE">
+              <a:rPr lang="nl-BE" altLang="nl-BE" dirty="0">
                 <a:ea typeface="MS Mincho" pitchFamily="49" charset="-128"/>
               </a:rPr>
               <a:t>, </a:t>
             </a:r>
             <a:r>
-              <a:rPr lang="nl-BE" altLang="nl-BE" err="1">
+              <a:rPr lang="nl-BE" altLang="nl-BE" dirty="0" err="1">
                 <a:ea typeface="MS Mincho" pitchFamily="49" charset="-128"/>
               </a:rPr>
               <a:t>an</a:t>
             </a:r>
             <a:r>
-              <a:rPr lang="nl-BE" altLang="nl-BE">
+              <a:rPr lang="nl-BE" altLang="nl-BE" dirty="0">
                 <a:ea typeface="MS Mincho" pitchFamily="49" charset="-128"/>
               </a:rPr>
               <a:t> </a:t>
             </a:r>
             <a:r>
-              <a:rPr lang="nl-BE" altLang="nl-BE" err="1">
+              <a:rPr lang="nl-BE" altLang="nl-BE" dirty="0" err="1">
                 <a:ea typeface="MS Mincho" pitchFamily="49" charset="-128"/>
               </a:rPr>
               <a:t>individual</a:t>
             </a:r>
             <a:r>
-              <a:rPr lang="nl-BE" altLang="nl-BE">
+              <a:rPr lang="nl-BE" altLang="nl-BE" dirty="0">
                 <a:ea typeface="MS Mincho" pitchFamily="49" charset="-128"/>
               </a:rPr>
-              <a:t> element can</a:t>
-            </a:r>
-            <a:r>
-              <a:rPr lang="nl-BE" altLang="nl-BE">
+              <a:t> element </a:t>
+            </a:r>
+            <a:r>
+              <a:rPr lang="nl-BE" altLang="nl-BE" dirty="0" err="1">
+                <a:ea typeface="MS Mincho" pitchFamily="49" charset="-128"/>
+              </a:rPr>
+              <a:t>can</a:t>
+            </a:r>
+            <a:r>
+              <a:rPr lang="nl-BE" altLang="nl-BE" dirty="0">
                 <a:solidFill>
                   <a:srgbClr val="4584B6"/>
                 </a:solidFill>
                 <a:ea typeface="MS Mincho" pitchFamily="49" charset="-128"/>
               </a:rPr>
-              <a:t> only </a:t>
-            </a:r>
-            <a:r>
-              <a:rPr lang="nl-BE" altLang="nl-BE">
+              <a:t> </a:t>
+            </a:r>
+            <a:r>
+              <a:rPr lang="nl-BE" altLang="nl-BE" dirty="0" err="1">
+                <a:solidFill>
+                  <a:srgbClr val="4584B6"/>
+                </a:solidFill>
                 <a:ea typeface="MS Mincho" pitchFamily="49" charset="-128"/>
               </a:rPr>
-              <a:t>be stored</a:t>
-            </a:r>
-            <a:r>
-              <a:rPr lang="nl-BE" altLang="nl-BE">
+              <a:t>only</a:t>
+            </a:r>
+            <a:r>
+              <a:rPr lang="nl-BE" altLang="nl-BE" dirty="0">
                 <a:solidFill>
                   <a:srgbClr val="4584B6"/>
                 </a:solidFill>
                 <a:ea typeface="MS Mincho" pitchFamily="49" charset="-128"/>
               </a:rPr>
-              <a:t> once.</a:t>
-            </a:r>
-          </a:p>
-          <a:p>
-            <a:r>
-              <a:rPr lang="nl-BE" altLang="nl-BE">
+              <a:t> </a:t>
+            </a:r>
+            <a:r>
+              <a:rPr lang="nl-BE" altLang="nl-BE" dirty="0" err="1">
                 <a:ea typeface="MS Mincho" pitchFamily="49" charset="-128"/>
               </a:rPr>
+              <a:t>be</a:t>
+            </a:r>
+            <a:r>
+              <a:rPr lang="nl-BE" altLang="nl-BE" dirty="0">
+                <a:ea typeface="MS Mincho" pitchFamily="49" charset="-128"/>
+              </a:rPr>
+              <a:t> </a:t>
+            </a:r>
+            <a:r>
+              <a:rPr lang="nl-BE" altLang="nl-BE" dirty="0" err="1">
+                <a:ea typeface="MS Mincho" pitchFamily="49" charset="-128"/>
+              </a:rPr>
+              <a:t>stored</a:t>
+            </a:r>
+            <a:r>
+              <a:rPr lang="nl-BE" altLang="nl-BE" dirty="0">
+                <a:solidFill>
+                  <a:srgbClr val="4584B6"/>
+                </a:solidFill>
+                <a:ea typeface="MS Mincho" pitchFamily="49" charset="-128"/>
+              </a:rPr>
+              <a:t> </a:t>
+            </a:r>
+            <a:r>
+              <a:rPr lang="nl-BE" altLang="nl-BE" dirty="0" err="1">
+                <a:solidFill>
+                  <a:srgbClr val="4584B6"/>
+                </a:solidFill>
+                <a:ea typeface="MS Mincho" pitchFamily="49" charset="-128"/>
+              </a:rPr>
+              <a:t>once</a:t>
+            </a:r>
+            <a:r>
+              <a:rPr lang="nl-BE" altLang="nl-BE" dirty="0">
+                <a:solidFill>
+                  <a:srgbClr val="4584B6"/>
+                </a:solidFill>
+                <a:ea typeface="MS Mincho" pitchFamily="49" charset="-128"/>
+              </a:rPr>
+              <a:t>.</a:t>
+            </a:r>
+          </a:p>
+          <a:p>
+            <a:r>
+              <a:rPr lang="nl-BE" altLang="nl-BE" dirty="0">
+                <a:ea typeface="MS Mincho" pitchFamily="49" charset="-128"/>
+              </a:rPr>
               <a:t>The set </a:t>
             </a:r>
             <a:r>
-              <a:rPr lang="nl-BE" altLang="nl-BE">
+              <a:rPr lang="nl-BE" altLang="nl-BE" dirty="0">
                 <a:solidFill>
                   <a:srgbClr val="4584B6"/>
                 </a:solidFill>
                 <a:ea typeface="MS Mincho" pitchFamily="49" charset="-128"/>
               </a:rPr>
-              <a:t>does not</a:t>
-            </a:r>
-            <a:r>
-              <a:rPr lang="nl-BE" altLang="nl-BE">
+              <a:t>does </a:t>
+            </a:r>
+            <a:r>
+              <a:rPr lang="nl-BE" altLang="nl-BE" dirty="0" err="1">
+                <a:solidFill>
+                  <a:srgbClr val="4584B6"/>
+                </a:solidFill>
                 <a:ea typeface="MS Mincho" pitchFamily="49" charset="-128"/>
               </a:rPr>
-              <a:t> have a specific order; the elements can be returned by </a:t>
-            </a:r>
-            <a:r>
-              <a:rPr lang="nl-BE" altLang="nl-BE" err="1">
+              <a:t>not</a:t>
+            </a:r>
+            <a:r>
+              <a:rPr lang="nl-BE" altLang="nl-BE" dirty="0">
                 <a:ea typeface="MS Mincho" pitchFamily="49" charset="-128"/>
               </a:rPr>
+              <a:t> have a </a:t>
+            </a:r>
+            <a:r>
+              <a:rPr lang="nl-BE" altLang="nl-BE" dirty="0" err="1">
+                <a:ea typeface="MS Mincho" pitchFamily="49" charset="-128"/>
+              </a:rPr>
+              <a:t>specific</a:t>
+            </a:r>
+            <a:r>
+              <a:rPr lang="nl-BE" altLang="nl-BE" dirty="0">
+                <a:ea typeface="MS Mincho" pitchFamily="49" charset="-128"/>
+              </a:rPr>
+              <a:t> order; </a:t>
+            </a:r>
+            <a:r>
+              <a:rPr lang="nl-BE" altLang="nl-BE" dirty="0" err="1">
+                <a:ea typeface="MS Mincho" pitchFamily="49" charset="-128"/>
+              </a:rPr>
+              <a:t>the</a:t>
+            </a:r>
+            <a:r>
+              <a:rPr lang="nl-BE" altLang="nl-BE" dirty="0">
+                <a:ea typeface="MS Mincho" pitchFamily="49" charset="-128"/>
+              </a:rPr>
+              <a:t> </a:t>
+            </a:r>
+            <a:r>
+              <a:rPr lang="nl-BE" altLang="nl-BE" dirty="0" err="1">
+                <a:ea typeface="MS Mincho" pitchFamily="49" charset="-128"/>
+              </a:rPr>
+              <a:t>elements</a:t>
+            </a:r>
+            <a:r>
+              <a:rPr lang="nl-BE" altLang="nl-BE" dirty="0">
+                <a:ea typeface="MS Mincho" pitchFamily="49" charset="-128"/>
+              </a:rPr>
+              <a:t> </a:t>
+            </a:r>
+            <a:r>
+              <a:rPr lang="nl-BE" altLang="nl-BE" dirty="0" err="1">
+                <a:ea typeface="MS Mincho" pitchFamily="49" charset="-128"/>
+              </a:rPr>
+              <a:t>can</a:t>
+            </a:r>
+            <a:r>
+              <a:rPr lang="nl-BE" altLang="nl-BE" dirty="0">
+                <a:ea typeface="MS Mincho" pitchFamily="49" charset="-128"/>
+              </a:rPr>
+              <a:t> </a:t>
+            </a:r>
+            <a:r>
+              <a:rPr lang="nl-BE" altLang="nl-BE" dirty="0" err="1">
+                <a:ea typeface="MS Mincho" pitchFamily="49" charset="-128"/>
+              </a:rPr>
+              <a:t>be</a:t>
+            </a:r>
+            <a:r>
+              <a:rPr lang="nl-BE" altLang="nl-BE" dirty="0">
+                <a:ea typeface="MS Mincho" pitchFamily="49" charset="-128"/>
+              </a:rPr>
+              <a:t> </a:t>
+            </a:r>
+            <a:r>
+              <a:rPr lang="nl-BE" altLang="nl-BE" dirty="0" err="1">
+                <a:ea typeface="MS Mincho" pitchFamily="49" charset="-128"/>
+              </a:rPr>
+              <a:t>returned</a:t>
+            </a:r>
+            <a:r>
+              <a:rPr lang="nl-BE" altLang="nl-BE" dirty="0">
+                <a:ea typeface="MS Mincho" pitchFamily="49" charset="-128"/>
+              </a:rPr>
+              <a:t> </a:t>
+            </a:r>
+            <a:r>
+              <a:rPr lang="nl-BE" altLang="nl-BE" dirty="0" err="1">
+                <a:ea typeface="MS Mincho" pitchFamily="49" charset="-128"/>
+              </a:rPr>
+              <a:t>by</a:t>
+            </a:r>
+            <a:r>
+              <a:rPr lang="nl-BE" altLang="nl-BE" dirty="0">
+                <a:ea typeface="MS Mincho" pitchFamily="49" charset="-128"/>
+              </a:rPr>
+              <a:t> </a:t>
+            </a:r>
+            <a:r>
+              <a:rPr lang="nl-BE" altLang="nl-BE" dirty="0" err="1">
+                <a:ea typeface="MS Mincho" pitchFamily="49" charset="-128"/>
+              </a:rPr>
               <a:t>iterator</a:t>
             </a:r>
             <a:r>
-              <a:rPr lang="nl-BE" altLang="nl-BE">
+              <a:rPr lang="nl-BE" altLang="nl-BE" dirty="0">
                 <a:ea typeface="MS Mincho" pitchFamily="49" charset="-128"/>
               </a:rPr>
-              <a:t> in a different order than the one in which they were </a:t>
-            </a:r>
-            <a:r>
-              <a:rPr lang="nl-BE" altLang="nl-BE" err="1">
+              <a:t> in a different order </a:t>
+            </a:r>
+            <a:r>
+              <a:rPr lang="nl-BE" altLang="nl-BE" dirty="0" err="1">
                 <a:ea typeface="MS Mincho" pitchFamily="49" charset="-128"/>
               </a:rPr>
+              <a:t>than</a:t>
+            </a:r>
+            <a:r>
+              <a:rPr lang="nl-BE" altLang="nl-BE" dirty="0">
+                <a:ea typeface="MS Mincho" pitchFamily="49" charset="-128"/>
+              </a:rPr>
+              <a:t> </a:t>
+            </a:r>
+            <a:r>
+              <a:rPr lang="nl-BE" altLang="nl-BE" dirty="0" err="1">
+                <a:ea typeface="MS Mincho" pitchFamily="49" charset="-128"/>
+              </a:rPr>
+              <a:t>the</a:t>
+            </a:r>
+            <a:r>
+              <a:rPr lang="nl-BE" altLang="nl-BE" dirty="0">
+                <a:ea typeface="MS Mincho" pitchFamily="49" charset="-128"/>
+              </a:rPr>
+              <a:t> </a:t>
+            </a:r>
+            <a:r>
+              <a:rPr lang="nl-BE" altLang="nl-BE" dirty="0" err="1">
+                <a:ea typeface="MS Mincho" pitchFamily="49" charset="-128"/>
+              </a:rPr>
+              <a:t>one</a:t>
+            </a:r>
+            <a:r>
+              <a:rPr lang="nl-BE" altLang="nl-BE" dirty="0">
+                <a:ea typeface="MS Mincho" pitchFamily="49" charset="-128"/>
+              </a:rPr>
+              <a:t> in </a:t>
+            </a:r>
+            <a:r>
+              <a:rPr lang="nl-BE" altLang="nl-BE" dirty="0" err="1">
+                <a:ea typeface="MS Mincho" pitchFamily="49" charset="-128"/>
+              </a:rPr>
+              <a:t>which</a:t>
+            </a:r>
+            <a:r>
+              <a:rPr lang="nl-BE" altLang="nl-BE" dirty="0">
+                <a:ea typeface="MS Mincho" pitchFamily="49" charset="-128"/>
+              </a:rPr>
+              <a:t> </a:t>
+            </a:r>
+            <a:r>
+              <a:rPr lang="nl-BE" altLang="nl-BE" dirty="0" err="1">
+                <a:ea typeface="MS Mincho" pitchFamily="49" charset="-128"/>
+              </a:rPr>
+              <a:t>they</a:t>
+            </a:r>
+            <a:r>
+              <a:rPr lang="nl-BE" altLang="nl-BE" dirty="0">
+                <a:ea typeface="MS Mincho" pitchFamily="49" charset="-128"/>
+              </a:rPr>
+              <a:t> </a:t>
+            </a:r>
+            <a:r>
+              <a:rPr lang="nl-BE" altLang="nl-BE" dirty="0" err="1">
+                <a:ea typeface="MS Mincho" pitchFamily="49" charset="-128"/>
+              </a:rPr>
+              <a:t>were</a:t>
+            </a:r>
+            <a:r>
+              <a:rPr lang="nl-BE" altLang="nl-BE" dirty="0">
+                <a:ea typeface="MS Mincho" pitchFamily="49" charset="-128"/>
+              </a:rPr>
+              <a:t> </a:t>
+            </a:r>
+            <a:r>
+              <a:rPr lang="nl-BE" altLang="nl-BE" dirty="0" err="1">
+                <a:ea typeface="MS Mincho" pitchFamily="49" charset="-128"/>
+              </a:rPr>
               <a:t>entered</a:t>
             </a:r>
             <a:r>
-              <a:rPr lang="nl-BE" altLang="nl-BE">
+              <a:rPr lang="nl-BE" altLang="nl-BE" dirty="0">
                 <a:ea typeface="MS Mincho" pitchFamily="49" charset="-128"/>
               </a:rPr>
               <a:t>.</a:t>
@@ -18518,84 +19210,84 @@
           <a:p>
             <a:pPr lvl="1"/>
             <a:r>
-              <a:rPr lang="nl-BE" altLang="nl-BE">
+              <a:rPr lang="nl-BE" altLang="nl-BE" dirty="0">
                 <a:ea typeface="MS Mincho" pitchFamily="49" charset="-128"/>
               </a:rPr>
               <a:t>The order </a:t>
             </a:r>
             <a:r>
-              <a:rPr lang="nl-BE" altLang="nl-BE" err="1">
+              <a:rPr lang="nl-BE" altLang="nl-BE" dirty="0" err="1">
                 <a:ea typeface="MS Mincho" pitchFamily="49" charset="-128"/>
               </a:rPr>
               <a:t>can</a:t>
             </a:r>
             <a:r>
-              <a:rPr lang="nl-BE" altLang="nl-BE">
+              <a:rPr lang="nl-BE" altLang="nl-BE" dirty="0">
                 <a:ea typeface="MS Mincho" pitchFamily="49" charset="-128"/>
               </a:rPr>
               <a:t> even change </a:t>
             </a:r>
             <a:r>
-              <a:rPr lang="nl-BE" altLang="nl-BE" err="1">
+              <a:rPr lang="nl-BE" altLang="nl-BE" dirty="0" err="1">
                 <a:ea typeface="MS Mincho" pitchFamily="49" charset="-128"/>
               </a:rPr>
               <a:t>if</a:t>
             </a:r>
             <a:r>
-              <a:rPr lang="nl-BE" altLang="nl-BE">
+              <a:rPr lang="nl-BE" altLang="nl-BE" dirty="0">
                 <a:ea typeface="MS Mincho" pitchFamily="49" charset="-128"/>
               </a:rPr>
               <a:t> </a:t>
             </a:r>
             <a:r>
-              <a:rPr lang="nl-BE" altLang="nl-BE" err="1">
+              <a:rPr lang="nl-BE" altLang="nl-BE" dirty="0" err="1">
                 <a:ea typeface="MS Mincho" pitchFamily="49" charset="-128"/>
               </a:rPr>
               <a:t>you</a:t>
             </a:r>
             <a:r>
-              <a:rPr lang="nl-BE" altLang="nl-BE">
+              <a:rPr lang="nl-BE" altLang="nl-BE" dirty="0">
                 <a:ea typeface="MS Mincho" pitchFamily="49" charset="-128"/>
               </a:rPr>
               <a:t> run </a:t>
             </a:r>
             <a:r>
-              <a:rPr lang="nl-BE" altLang="nl-BE" err="1">
+              <a:rPr lang="nl-BE" altLang="nl-BE" dirty="0" err="1">
                 <a:ea typeface="MS Mincho" pitchFamily="49" charset="-128"/>
               </a:rPr>
               <a:t>the</a:t>
             </a:r>
             <a:r>
-              <a:rPr lang="nl-BE" altLang="nl-BE">
+              <a:rPr lang="nl-BE" altLang="nl-BE" dirty="0">
                 <a:ea typeface="MS Mincho" pitchFamily="49" charset="-128"/>
               </a:rPr>
               <a:t> program </a:t>
             </a:r>
             <a:r>
-              <a:rPr lang="nl-BE" altLang="nl-BE" err="1">
+              <a:rPr lang="nl-BE" altLang="nl-BE" dirty="0" err="1">
                 <a:ea typeface="MS Mincho" pitchFamily="49" charset="-128"/>
               </a:rPr>
               <a:t>twice</a:t>
             </a:r>
-            <a:endParaRPr lang="nl-BE" altLang="nl-BE">
+            <a:endParaRPr lang="nl-BE" altLang="nl-BE" dirty="0">
               <a:ea typeface="MS Mincho" pitchFamily="49" charset="-128"/>
             </a:endParaRPr>
           </a:p>
           <a:p>
             <a:r>
-              <a:rPr lang="nl-BE" altLang="nl-BE" err="1">
+              <a:rPr lang="nl-BE" altLang="nl-BE" dirty="0" err="1">
                 <a:ea typeface="MS Mincho" pitchFamily="49" charset="-128"/>
               </a:rPr>
               <a:t>Individual</a:t>
             </a:r>
             <a:r>
-              <a:rPr lang="nl-BE" altLang="nl-BE">
+              <a:rPr lang="nl-BE" altLang="nl-BE" dirty="0">
                 <a:ea typeface="MS Mincho" pitchFamily="49" charset="-128"/>
               </a:rPr>
               <a:t> </a:t>
             </a:r>
             <a:r>
-              <a:rPr lang="nl-BE" altLang="nl-BE" err="1">
+              <a:rPr lang="nl-BE" altLang="nl-BE" dirty="0" err="1">
                 <a:solidFill>
                   <a:srgbClr val="4584B6"/>
                 </a:solidFill>
@@ -18604,7 +19296,7 @@
               <a:t>elements</a:t>
             </a:r>
             <a:r>
-              <a:rPr lang="nl-BE" altLang="nl-BE">
+              <a:rPr lang="nl-BE" altLang="nl-BE" dirty="0">
                 <a:solidFill>
                   <a:srgbClr val="4584B6"/>
                 </a:solidFill>
@@ -18613,7 +19305,7 @@
               <a:t> of a set are </a:t>
             </a:r>
             <a:r>
-              <a:rPr lang="nl-BE" altLang="nl-BE" err="1">
+              <a:rPr lang="nl-BE" altLang="nl-BE" dirty="0" err="1">
                 <a:solidFill>
                   <a:srgbClr val="4584B6"/>
                 </a:solidFill>
@@ -18622,7 +19314,7 @@
               <a:t>not</a:t>
             </a:r>
             <a:r>
-              <a:rPr lang="nl-BE" altLang="nl-BE">
+              <a:rPr lang="nl-BE" altLang="nl-BE" dirty="0">
                 <a:solidFill>
                   <a:srgbClr val="4584B6"/>
                 </a:solidFill>
@@ -18631,7 +19323,7 @@
               <a:t> </a:t>
             </a:r>
             <a:r>
-              <a:rPr lang="nl-BE" altLang="nl-BE" err="1">
+              <a:rPr lang="nl-BE" altLang="nl-BE" dirty="0" err="1">
                 <a:solidFill>
                   <a:srgbClr val="4584B6"/>
                 </a:solidFill>
@@ -18639,7 +19331,7 @@
               </a:rPr>
               <a:t>changeable</a:t>
             </a:r>
-            <a:endParaRPr lang="nl-BE" altLang="nl-BE">
+            <a:endParaRPr lang="nl-BE" altLang="nl-BE" dirty="0">
               <a:solidFill>
                 <a:srgbClr val="4584B6"/>
               </a:solidFill>
@@ -18649,37 +19341,37 @@
           <a:p>
             <a:pPr lvl="1"/>
             <a:r>
-              <a:rPr lang="nl-BE" altLang="nl-BE">
+              <a:rPr lang="nl-BE" altLang="nl-BE" dirty="0">
                 <a:ea typeface="MS Mincho" pitchFamily="49" charset="-128"/>
               </a:rPr>
               <a:t>But </a:t>
             </a:r>
             <a:r>
-              <a:rPr lang="nl-BE" altLang="nl-BE" err="1">
+              <a:rPr lang="nl-BE" altLang="nl-BE" dirty="0" err="1">
                 <a:ea typeface="MS Mincho" pitchFamily="49" charset="-128"/>
               </a:rPr>
               <a:t>you</a:t>
             </a:r>
             <a:r>
-              <a:rPr lang="nl-BE" altLang="nl-BE">
+              <a:rPr lang="nl-BE" altLang="nl-BE" dirty="0">
                 <a:ea typeface="MS Mincho" pitchFamily="49" charset="-128"/>
               </a:rPr>
               <a:t> </a:t>
             </a:r>
             <a:r>
-              <a:rPr lang="nl-BE" altLang="nl-BE" err="1">
+              <a:rPr lang="nl-BE" altLang="nl-BE" dirty="0" err="1">
                 <a:ea typeface="MS Mincho" pitchFamily="49" charset="-128"/>
               </a:rPr>
               <a:t>can</a:t>
             </a:r>
             <a:r>
-              <a:rPr lang="nl-BE" altLang="nl-BE">
+              <a:rPr lang="nl-BE" altLang="nl-BE" dirty="0">
                 <a:ea typeface="MS Mincho" pitchFamily="49" charset="-128"/>
               </a:rPr>
               <a:t> </a:t>
             </a:r>
             <a:r>
-              <a:rPr lang="nl-BE" altLang="nl-BE" sz="2800" err="1">
+              <a:rPr lang="nl-BE" altLang="nl-BE" dirty="0" err="1">
                 <a:solidFill>
                   <a:srgbClr val="4584B6"/>
                 </a:solidFill>
@@ -18688,25 +19380,25 @@
               <a:t>remove</a:t>
             </a:r>
             <a:r>
-              <a:rPr lang="nl-BE" altLang="nl-BE">
+              <a:rPr lang="nl-BE" altLang="nl-BE" dirty="0">
                 <a:ea typeface="MS Mincho" pitchFamily="49" charset="-128"/>
               </a:rPr>
               <a:t> </a:t>
             </a:r>
             <a:r>
-              <a:rPr lang="nl-BE" altLang="nl-BE" err="1">
+              <a:rPr lang="nl-BE" altLang="nl-BE" dirty="0" err="1">
                 <a:ea typeface="MS Mincho" pitchFamily="49" charset="-128"/>
               </a:rPr>
               <a:t>an</a:t>
             </a:r>
             <a:r>
-              <a:rPr lang="nl-BE" altLang="nl-BE">
+              <a:rPr lang="nl-BE" altLang="nl-BE" dirty="0">
                 <a:ea typeface="MS Mincho" pitchFamily="49" charset="-128"/>
               </a:rPr>
               <a:t> item or </a:t>
             </a:r>
             <a:r>
-              <a:rPr lang="nl-BE" altLang="nl-BE" sz="2800" err="1">
+              <a:rPr lang="nl-BE" altLang="nl-BE" dirty="0" err="1">
                 <a:solidFill>
                   <a:srgbClr val="4584B6"/>
                 </a:solidFill>
@@ -18715,29 +19407,29 @@
               <a:t>add</a:t>
             </a:r>
             <a:r>
-              <a:rPr lang="nl-BE" altLang="nl-BE">
+              <a:rPr lang="nl-BE" altLang="nl-BE" dirty="0">
                 <a:ea typeface="MS Mincho" pitchFamily="49" charset="-128"/>
               </a:rPr>
               <a:t> a new </a:t>
             </a:r>
             <a:r>
-              <a:rPr lang="nl-BE" altLang="nl-BE" err="1">
+              <a:rPr lang="nl-BE" altLang="nl-BE" dirty="0" err="1">
                 <a:ea typeface="MS Mincho" pitchFamily="49" charset="-128"/>
               </a:rPr>
               <a:t>one</a:t>
             </a:r>
-            <a:endParaRPr lang="nl-BE" altLang="nl-BE">
+            <a:endParaRPr lang="nl-BE" altLang="nl-BE" dirty="0">
               <a:ea typeface="MS Mincho" pitchFamily="49" charset="-128"/>
             </a:endParaRPr>
           </a:p>
           <a:p>
             <a:pPr lvl="1"/>
-            <a:endParaRPr lang="en-US" sz="2800">
+            <a:endParaRPr lang="en-US" sz="2800" dirty="0">
               <a:latin typeface="Calibri" pitchFamily="34" charset="0"/>
             </a:endParaRPr>
           </a:p>
           <a:p>
-            <a:endParaRPr lang="nl-BE"/>
+            <a:endParaRPr lang="nl-BE" dirty="0"/>
           </a:p>
         </p:txBody>
       </p:sp>
@@ -19227,8 +19919,8 @@
         </p:nvSpPr>
         <p:spPr bwMode="auto">
           <a:xfrm>
-            <a:off x="2160189" y="3491924"/>
-            <a:ext cx="3532738" cy="3046988"/>
+            <a:off x="2160188" y="3615034"/>
+            <a:ext cx="4627111" cy="2800767"/>
           </a:xfrm>
           <a:prstGeom prst="rect">
             <a:avLst/>
@@ -19267,7 +19959,7 @@
               <a:tabLst/>
             </a:pPr>
             <a:r>
-              <a:rPr kumimoji="0" lang="nl-BE" altLang="nl-BE" sz="1600" b="0" i="0" u="none" strike="noStrike" cap="none" normalizeH="0" baseline="0" err="1">
+              <a:rPr kumimoji="0" lang="nl-BE" altLang="nl-BE" sz="1600" b="0" i="0" u="none" strike="noStrike" cap="none" normalizeH="0" baseline="0" dirty="0" err="1">
                 <a:ln>
                   <a:noFill/>
                 </a:ln>
@@ -19280,7 +19972,7 @@
               <a:t>numbers</a:t>
             </a:r>
             <a:r>
-              <a:rPr kumimoji="0" lang="nl-BE" altLang="nl-BE" sz="1600" b="0" i="0" u="none" strike="noStrike" cap="none" normalizeH="0" baseline="0">
+              <a:rPr kumimoji="0" lang="nl-BE" altLang="nl-BE" sz="1600" b="0" i="0" u="none" strike="noStrike" cap="none" normalizeH="0" baseline="0" dirty="0">
                 <a:ln>
                   <a:noFill/>
                 </a:ln>
@@ -19293,7 +19985,7 @@
               <a:t> = {</a:t>
             </a:r>
             <a:r>
-              <a:rPr kumimoji="0" lang="nl-BE" altLang="nl-BE" sz="1600" b="0" i="0" u="none" strike="noStrike" cap="none" normalizeH="0" baseline="0">
+              <a:rPr kumimoji="0" lang="nl-BE" altLang="nl-BE" sz="1600" b="0" i="0" u="none" strike="noStrike" cap="none" normalizeH="0" baseline="0" dirty="0">
                 <a:ln>
                   <a:noFill/>
                 </a:ln>
@@ -19306,7 +19998,7 @@
               <a:t>10</a:t>
             </a:r>
             <a:r>
-              <a:rPr kumimoji="0" lang="nl-BE" altLang="nl-BE" sz="1600" b="0" i="0" u="none" strike="noStrike" cap="none" normalizeH="0" baseline="0">
+              <a:rPr kumimoji="0" lang="nl-BE" altLang="nl-BE" sz="1600" b="0" i="0" u="none" strike="noStrike" cap="none" normalizeH="0" baseline="0" dirty="0">
                 <a:ln>
                   <a:noFill/>
                 </a:ln>
@@ -19319,7 +20011,7 @@
               <a:t>, </a:t>
             </a:r>
             <a:r>
-              <a:rPr kumimoji="0" lang="nl-BE" altLang="nl-BE" sz="1600" b="0" i="0" u="none" strike="noStrike" cap="none" normalizeH="0" baseline="0">
+              <a:rPr kumimoji="0" lang="nl-BE" altLang="nl-BE" sz="1600" b="0" i="0" u="none" strike="noStrike" cap="none" normalizeH="0" baseline="0" dirty="0">
                 <a:ln>
                   <a:noFill/>
                 </a:ln>
@@ -19332,7 +20024,7 @@
               <a:t>90</a:t>
             </a:r>
             <a:r>
-              <a:rPr kumimoji="0" lang="nl-BE" altLang="nl-BE" sz="1600" b="0" i="0" u="none" strike="noStrike" cap="none" normalizeH="0" baseline="0">
+              <a:rPr kumimoji="0" lang="nl-BE" altLang="nl-BE" sz="1600" b="0" i="0" u="none" strike="noStrike" cap="none" normalizeH="0" baseline="0" dirty="0">
                 <a:ln>
                   <a:noFill/>
                 </a:ln>
@@ -19345,7 +20037,7 @@
               <a:t>, </a:t>
             </a:r>
             <a:r>
-              <a:rPr kumimoji="0" lang="nl-BE" altLang="nl-BE" sz="1600" b="0" i="0" u="none" strike="noStrike" cap="none" normalizeH="0" baseline="0">
+              <a:rPr kumimoji="0" lang="nl-BE" altLang="nl-BE" sz="1600" b="0" i="0" u="none" strike="noStrike" cap="none" normalizeH="0" baseline="0" dirty="0">
                 <a:ln>
                   <a:noFill/>
                 </a:ln>
@@ -19358,7 +20050,7 @@
               <a:t>70</a:t>
             </a:r>
             <a:r>
-              <a:rPr kumimoji="0" lang="nl-BE" altLang="nl-BE" sz="1600" b="0" i="0" u="none" strike="noStrike" cap="none" normalizeH="0" baseline="0">
+              <a:rPr kumimoji="0" lang="nl-BE" altLang="nl-BE" sz="1600" b="0" i="0" u="none" strike="noStrike" cap="none" normalizeH="0" baseline="0" dirty="0">
                 <a:ln>
                   <a:noFill/>
                 </a:ln>
@@ -19371,7 +20063,7 @@
               <a:t>, </a:t>
             </a:r>
             <a:r>
-              <a:rPr kumimoji="0" lang="nl-BE" altLang="nl-BE" sz="1600" b="0" i="0" u="none" strike="noStrike" cap="none" normalizeH="0" baseline="0">
+              <a:rPr kumimoji="0" lang="nl-BE" altLang="nl-BE" sz="1600" b="0" i="0" u="none" strike="noStrike" cap="none" normalizeH="0" baseline="0" dirty="0">
                 <a:ln>
                   <a:noFill/>
                 </a:ln>
@@ -19384,7 +20076,7 @@
               <a:t>56</a:t>
             </a:r>
             <a:r>
-              <a:rPr kumimoji="0" lang="nl-BE" altLang="nl-BE" sz="1600" b="0" i="0" u="none" strike="noStrike" cap="none" normalizeH="0" baseline="0">
+              <a:rPr kumimoji="0" lang="nl-BE" altLang="nl-BE" sz="1600" b="0" i="0" u="none" strike="noStrike" cap="none" normalizeH="0" baseline="0" dirty="0">
                 <a:ln>
                   <a:noFill/>
                 </a:ln>
@@ -19397,7 +20089,7 @@
               <a:t>}</a:t>
             </a:r>
             <a:br>
-              <a:rPr kumimoji="0" lang="nl-BE" altLang="nl-BE" sz="1600" b="0" i="0" u="none" strike="noStrike" cap="none" normalizeH="0" baseline="0">
+              <a:rPr kumimoji="0" lang="nl-BE" altLang="nl-BE" sz="1600" b="0" i="0" u="none" strike="noStrike" cap="none" normalizeH="0" baseline="0" dirty="0">
                 <a:ln>
                   <a:noFill/>
                 </a:ln>
@@ -19409,7 +20101,7 @@
               </a:rPr>
             </a:br>
             <a:r>
-              <a:rPr kumimoji="0" lang="nl-BE" altLang="nl-BE" sz="1600" b="0" i="0" u="none" strike="noStrike" cap="none" normalizeH="0" baseline="0" err="1">
+              <a:rPr kumimoji="0" lang="nl-BE" altLang="nl-BE" sz="1600" b="0" i="0" u="none" strike="noStrike" cap="none" normalizeH="0" baseline="0" dirty="0" err="1">
                 <a:ln>
                   <a:noFill/>
                 </a:ln>
@@ -19422,7 +20114,7 @@
               <a:t>french_letters</a:t>
             </a:r>
             <a:r>
-              <a:rPr kumimoji="0" lang="nl-BE" altLang="nl-BE" sz="1600" b="0" i="0" u="none" strike="noStrike" cap="none" normalizeH="0" baseline="0">
+              <a:rPr kumimoji="0" lang="nl-BE" altLang="nl-BE" sz="1600" b="0" i="0" u="none" strike="noStrike" cap="none" normalizeH="0" baseline="0" dirty="0">
                 <a:ln>
                   <a:noFill/>
                 </a:ln>
@@ -19435,7 +20127,7 @@
               <a:t> = </a:t>
             </a:r>
             <a:r>
-              <a:rPr kumimoji="0" lang="nl-BE" altLang="nl-BE" sz="1600" b="0" i="0" u="none" strike="noStrike" cap="none" normalizeH="0" baseline="0">
+              <a:rPr kumimoji="0" lang="nl-BE" altLang="nl-BE" sz="1600" b="0" i="0" u="none" strike="noStrike" cap="none" normalizeH="0" baseline="0" dirty="0">
                 <a:ln>
                   <a:noFill/>
                 </a:ln>
@@ -19448,7 +20140,7 @@
               <a:t>set</a:t>
             </a:r>
             <a:r>
-              <a:rPr kumimoji="0" lang="nl-BE" altLang="nl-BE" sz="1600" b="0" i="0" u="none" strike="noStrike" cap="none" normalizeH="0" baseline="0">
+              <a:rPr kumimoji="0" lang="nl-BE" altLang="nl-BE" sz="1600" b="0" i="0" u="none" strike="noStrike" cap="none" normalizeH="0" baseline="0" dirty="0">
                 <a:ln>
                   <a:noFill/>
                 </a:ln>
@@ -19461,7 +20153,7 @@
               <a:t>()</a:t>
             </a:r>
             <a:br>
-              <a:rPr kumimoji="0" lang="nl-BE" altLang="nl-BE" sz="1600" b="0" i="0" u="none" strike="noStrike" cap="none" normalizeH="0" baseline="0">
+              <a:rPr kumimoji="0" lang="nl-BE" altLang="nl-BE" sz="1600" b="0" i="0" u="none" strike="noStrike" cap="none" normalizeH="0" baseline="0" dirty="0">
                 <a:ln>
                   <a:noFill/>
                 </a:ln>
@@ -19473,7 +20165,7 @@
               </a:rPr>
             </a:br>
             <a:r>
-              <a:rPr kumimoji="0" lang="nl-BE" altLang="nl-BE" sz="1600" b="0" i="0" u="none" strike="noStrike" cap="none" normalizeH="0" baseline="0" err="1">
+              <a:rPr kumimoji="0" lang="nl-BE" altLang="nl-BE" sz="1600" b="0" i="0" u="none" strike="noStrike" cap="none" normalizeH="0" baseline="0" dirty="0" err="1">
                 <a:ln>
                   <a:noFill/>
                 </a:ln>
@@ -19486,7 +20178,7 @@
               <a:t>for</a:t>
             </a:r>
             <a:r>
-              <a:rPr kumimoji="0" lang="nl-BE" altLang="nl-BE" sz="1600" b="0" i="0" u="none" strike="noStrike" cap="none" normalizeH="0" baseline="0">
+              <a:rPr kumimoji="0" lang="nl-BE" altLang="nl-BE" sz="1600" b="0" i="0" u="none" strike="noStrike" cap="none" normalizeH="0" baseline="0" dirty="0">
                 <a:ln>
                   <a:noFill/>
                 </a:ln>
@@ -19499,7 +20191,7 @@
               <a:t> </a:t>
             </a:r>
             <a:r>
-              <a:rPr kumimoji="0" lang="nl-BE" altLang="nl-BE" sz="1600" b="0" i="0" u="none" strike="noStrike" cap="none" normalizeH="0" baseline="0" err="1">
+              <a:rPr kumimoji="0" lang="nl-BE" altLang="nl-BE" sz="1600" b="0" i="0" u="none" strike="noStrike" cap="none" normalizeH="0" baseline="0" dirty="0" err="1">
                 <a:ln>
                   <a:noFill/>
                 </a:ln>
@@ -19512,7 +20204,7 @@
               <a:t>sign</a:t>
             </a:r>
             <a:r>
-              <a:rPr kumimoji="0" lang="nl-BE" altLang="nl-BE" sz="1600" b="0" i="0" u="none" strike="noStrike" cap="none" normalizeH="0" baseline="0">
+              <a:rPr kumimoji="0" lang="nl-BE" altLang="nl-BE" sz="1600" b="0" i="0" u="none" strike="noStrike" cap="none" normalizeH="0" baseline="0" dirty="0">
                 <a:ln>
                   <a:noFill/>
                 </a:ln>
@@ -19525,7 +20217,7 @@
               <a:t> </a:t>
             </a:r>
             <a:r>
-              <a:rPr kumimoji="0" lang="nl-BE" altLang="nl-BE" sz="1600" b="0" i="0" u="none" strike="noStrike" cap="none" normalizeH="0" baseline="0">
+              <a:rPr kumimoji="0" lang="nl-BE" altLang="nl-BE" sz="1600" b="0" i="0" u="none" strike="noStrike" cap="none" normalizeH="0" baseline="0" dirty="0">
                 <a:ln>
                   <a:noFill/>
                 </a:ln>
@@ -19538,7 +20230,7 @@
               <a:t>in </a:t>
             </a:r>
             <a:r>
-              <a:rPr kumimoji="0" lang="nl-BE" altLang="nl-BE" sz="1600" b="1" i="0" u="none" strike="noStrike" cap="none" normalizeH="0" baseline="0">
+              <a:rPr kumimoji="0" lang="nl-BE" altLang="nl-BE" sz="1600" b="1" i="0" u="none" strike="noStrike" cap="none" normalizeH="0" baseline="0" dirty="0">
                 <a:ln>
                   <a:noFill/>
                 </a:ln>
@@ -19551,7 +20243,7 @@
               <a:t>"</a:t>
             </a:r>
             <a:r>
-              <a:rPr kumimoji="0" lang="nl-BE" altLang="nl-BE" sz="1600" b="1" i="0" u="none" strike="noStrike" cap="none" normalizeH="0" baseline="0" err="1">
+              <a:rPr kumimoji="0" lang="nl-BE" altLang="nl-BE" sz="1600" b="1" i="0" u="none" strike="noStrike" cap="none" normalizeH="0" baseline="0" dirty="0" err="1">
                 <a:ln>
                   <a:noFill/>
                 </a:ln>
@@ -19564,7 +20256,7 @@
               <a:t>éçàèéàèçé</a:t>
             </a:r>
             <a:r>
-              <a:rPr kumimoji="0" lang="nl-BE" altLang="nl-BE" sz="1600" b="1" i="0" u="none" strike="noStrike" cap="none" normalizeH="0" baseline="0">
+              <a:rPr kumimoji="0" lang="nl-BE" altLang="nl-BE" sz="1600" b="1" i="0" u="none" strike="noStrike" cap="none" normalizeH="0" baseline="0" dirty="0">
                 <a:ln>
                   <a:noFill/>
                 </a:ln>
@@ -19577,7 +20269,7 @@
               <a:t>"</a:t>
             </a:r>
             <a:r>
-              <a:rPr kumimoji="0" lang="nl-BE" altLang="nl-BE" sz="1600" b="0" i="0" u="none" strike="noStrike" cap="none" normalizeH="0" baseline="0">
+              <a:rPr kumimoji="0" lang="nl-BE" altLang="nl-BE" sz="1600" b="0" i="0" u="none" strike="noStrike" cap="none" normalizeH="0" baseline="0" dirty="0">
                 <a:ln>
                   <a:noFill/>
                 </a:ln>
@@ -19590,7 +20282,7 @@
               <a:t>:</a:t>
             </a:r>
             <a:br>
-              <a:rPr kumimoji="0" lang="nl-BE" altLang="nl-BE" sz="1600" b="0" i="0" u="none" strike="noStrike" cap="none" normalizeH="0" baseline="0">
+              <a:rPr kumimoji="0" lang="nl-BE" altLang="nl-BE" sz="1600" b="0" i="0" u="none" strike="noStrike" cap="none" normalizeH="0" baseline="0" dirty="0">
                 <a:ln>
                   <a:noFill/>
                 </a:ln>
@@ -19602,7 +20294,7 @@
               </a:rPr>
             </a:br>
             <a:r>
-              <a:rPr kumimoji="0" lang="nl-BE" altLang="nl-BE" sz="1600" b="0" i="0" u="none" strike="noStrike" cap="none" normalizeH="0" baseline="0">
+              <a:rPr kumimoji="0" lang="nl-BE" altLang="nl-BE" sz="1600" b="0" i="0" u="none" strike="noStrike" cap="none" normalizeH="0" baseline="0" dirty="0">
                 <a:ln>
                   <a:noFill/>
                 </a:ln>
@@ -19615,7 +20307,7 @@
               <a:t>     </a:t>
             </a:r>
             <a:r>
-              <a:rPr kumimoji="0" lang="nl-BE" altLang="nl-BE" sz="1600" b="0" i="0" u="none" strike="noStrike" cap="none" normalizeH="0" baseline="0" err="1">
+              <a:rPr kumimoji="0" lang="nl-BE" altLang="nl-BE" sz="1600" b="0" i="0" u="none" strike="noStrike" cap="none" normalizeH="0" baseline="0" dirty="0" err="1">
                 <a:ln>
                   <a:noFill/>
                 </a:ln>
@@ -19628,7 +20320,7 @@
               <a:t>french_letters.add</a:t>
             </a:r>
             <a:r>
-              <a:rPr kumimoji="0" lang="nl-BE" altLang="nl-BE" sz="1600" b="0" i="0" u="none" strike="noStrike" cap="none" normalizeH="0" baseline="0">
+              <a:rPr kumimoji="0" lang="nl-BE" altLang="nl-BE" sz="1600" b="0" i="0" u="none" strike="noStrike" cap="none" normalizeH="0" baseline="0" dirty="0">
                 <a:ln>
                   <a:noFill/>
                 </a:ln>
@@ -19641,7 +20333,7 @@
               <a:t>(</a:t>
             </a:r>
             <a:r>
-              <a:rPr kumimoji="0" lang="nl-BE" altLang="nl-BE" sz="1600" b="0" i="0" u="none" strike="noStrike" cap="none" normalizeH="0" baseline="0" err="1">
+              <a:rPr kumimoji="0" lang="nl-BE" altLang="nl-BE" sz="1600" b="0" i="0" u="none" strike="noStrike" cap="none" normalizeH="0" baseline="0" dirty="0" err="1">
                 <a:ln>
                   <a:noFill/>
                 </a:ln>
@@ -19654,7 +20346,7 @@
               <a:t>sign</a:t>
             </a:r>
             <a:r>
-              <a:rPr kumimoji="0" lang="nl-BE" altLang="nl-BE" sz="1600" b="0" i="0" u="none" strike="noStrike" cap="none" normalizeH="0" baseline="0">
+              <a:rPr kumimoji="0" lang="nl-BE" altLang="nl-BE" sz="1600" b="0" i="0" u="none" strike="noStrike" cap="none" normalizeH="0" baseline="0" dirty="0">
                 <a:ln>
                   <a:noFill/>
                 </a:ln>
@@ -19667,7 +20359,7 @@
               <a:t>)</a:t>
             </a:r>
             <a:br>
-              <a:rPr kumimoji="0" lang="nl-BE" altLang="nl-BE" sz="1600" b="0" i="0" u="none" strike="noStrike" cap="none" normalizeH="0" baseline="0">
+              <a:rPr kumimoji="0" lang="nl-BE" altLang="nl-BE" sz="1600" b="0" i="0" u="none" strike="noStrike" cap="none" normalizeH="0" baseline="0" dirty="0">
                 <a:ln>
                   <a:noFill/>
                 </a:ln>
@@ -19679,7 +20371,7 @@
               </a:rPr>
             </a:br>
             <a:r>
-              <a:rPr kumimoji="0" lang="nl-BE" altLang="nl-BE" sz="1600" b="0" i="0" u="none" strike="noStrike" cap="none" normalizeH="0" baseline="0" err="1">
+              <a:rPr kumimoji="0" lang="nl-BE" altLang="nl-BE" sz="1600" b="0" i="0" u="none" strike="noStrike" cap="none" normalizeH="0" baseline="0" dirty="0" err="1">
                 <a:ln>
                   <a:noFill/>
                 </a:ln>
@@ -19692,7 +20384,7 @@
               <a:t>vowels</a:t>
             </a:r>
             <a:r>
-              <a:rPr kumimoji="0" lang="nl-BE" altLang="nl-BE" sz="1600" b="0" i="0" u="none" strike="noStrike" cap="none" normalizeH="0" baseline="0">
+              <a:rPr kumimoji="0" lang="nl-BE" altLang="nl-BE" sz="1600" b="0" i="0" u="none" strike="noStrike" cap="none" normalizeH="0" baseline="0" dirty="0">
                 <a:ln>
                   <a:noFill/>
                 </a:ln>
@@ -19705,7 +20397,7 @@
               <a:t> = </a:t>
             </a:r>
             <a:r>
-              <a:rPr kumimoji="0" lang="nl-BE" altLang="nl-BE" sz="1600" b="0" i="0" u="none" strike="noStrike" cap="none" normalizeH="0" baseline="0">
+              <a:rPr kumimoji="0" lang="nl-BE" altLang="nl-BE" sz="1600" b="0" i="0" u="none" strike="noStrike" cap="none" normalizeH="0" baseline="0" dirty="0">
                 <a:ln>
                   <a:noFill/>
                 </a:ln>
@@ -19718,7 +20410,7 @@
               <a:t>set</a:t>
             </a:r>
             <a:r>
-              <a:rPr kumimoji="0" lang="nl-BE" altLang="nl-BE" sz="1600" b="0" i="0" u="none" strike="noStrike" cap="none" normalizeH="0" baseline="0">
+              <a:rPr kumimoji="0" lang="nl-BE" altLang="nl-BE" sz="1600" b="0" i="0" u="none" strike="noStrike" cap="none" normalizeH="0" baseline="0" dirty="0">
                 <a:ln>
                   <a:noFill/>
                 </a:ln>
@@ -19731,7 +20423,7 @@
               <a:t>(</a:t>
             </a:r>
             <a:r>
-              <a:rPr kumimoji="0" lang="nl-BE" altLang="nl-BE" sz="1600" b="1" i="0" u="none" strike="noStrike" cap="none" normalizeH="0" baseline="0">
+              <a:rPr kumimoji="0" lang="nl-BE" altLang="nl-BE" sz="1600" b="1" i="0" u="none" strike="noStrike" cap="none" normalizeH="0" baseline="0" dirty="0">
                 <a:ln>
                   <a:noFill/>
                 </a:ln>
@@ -19744,7 +20436,7 @@
               <a:t>'</a:t>
             </a:r>
             <a:r>
-              <a:rPr kumimoji="0" lang="nl-BE" altLang="nl-BE" sz="1600" b="1" i="0" u="none" strike="noStrike" cap="none" normalizeH="0" baseline="0" err="1">
+              <a:rPr kumimoji="0" lang="nl-BE" altLang="nl-BE" sz="1600" b="1" i="0" u="none" strike="noStrike" cap="none" normalizeH="0" baseline="0" dirty="0" err="1">
                 <a:ln>
                   <a:noFill/>
                 </a:ln>
@@ -19757,7 +20449,7 @@
               <a:t>aeiou</a:t>
             </a:r>
             <a:r>
-              <a:rPr kumimoji="0" lang="nl-BE" altLang="nl-BE" sz="1600" b="1" i="0" u="none" strike="noStrike" cap="none" normalizeH="0" baseline="0">
+              <a:rPr kumimoji="0" lang="nl-BE" altLang="nl-BE" sz="1600" b="1" i="0" u="none" strike="noStrike" cap="none" normalizeH="0" baseline="0" dirty="0">
                 <a:ln>
                   <a:noFill/>
                 </a:ln>
@@ -19770,7 +20462,7 @@
               <a:t>'</a:t>
             </a:r>
             <a:r>
-              <a:rPr kumimoji="0" lang="nl-BE" altLang="nl-BE" sz="1600" b="0" i="0" u="none" strike="noStrike" cap="none" normalizeH="0" baseline="0">
+              <a:rPr kumimoji="0" lang="nl-BE" altLang="nl-BE" sz="1600" b="0" i="0" u="none" strike="noStrike" cap="none" normalizeH="0" baseline="0" dirty="0">
                 <a:ln>
                   <a:noFill/>
                 </a:ln>
@@ -19783,7 +20475,7 @@
               <a:t>)</a:t>
             </a:r>
             <a:br>
-              <a:rPr kumimoji="0" lang="nl-BE" altLang="nl-BE" sz="1600" b="0" i="0" u="none" strike="noStrike" cap="none" normalizeH="0" baseline="0">
+              <a:rPr kumimoji="0" lang="nl-BE" altLang="nl-BE" sz="1600" b="0" i="0" u="none" strike="noStrike" cap="none" normalizeH="0" baseline="0" dirty="0">
                 <a:ln>
                   <a:noFill/>
                 </a:ln>
@@ -19795,7 +20487,7 @@
               </a:rPr>
             </a:br>
             <a:r>
-              <a:rPr kumimoji="0" lang="nl-BE" altLang="nl-BE" sz="1600" b="0" i="0" u="none" strike="noStrike" cap="none" normalizeH="0" baseline="0">
+              <a:rPr kumimoji="0" lang="nl-BE" altLang="nl-BE" sz="1600" b="0" i="0" u="none" strike="noStrike" cap="none" normalizeH="0" baseline="0" dirty="0">
                 <a:ln>
                   <a:noFill/>
                 </a:ln>
@@ -19808,7 +20500,7 @@
               <a:t>squares = </a:t>
             </a:r>
             <a:r>
-              <a:rPr kumimoji="0" lang="nl-BE" altLang="nl-BE" sz="1600" b="0" i="0" u="none" strike="noStrike" cap="none" normalizeH="0" baseline="0">
+              <a:rPr kumimoji="0" lang="nl-BE" altLang="nl-BE" sz="1600" b="0" i="0" u="none" strike="noStrike" cap="none" normalizeH="0" baseline="0" dirty="0">
                 <a:ln>
                   <a:noFill/>
                 </a:ln>
@@ -19821,7 +20513,7 @@
               <a:t>set</a:t>
             </a:r>
             <a:r>
-              <a:rPr kumimoji="0" lang="nl-BE" altLang="nl-BE" sz="1600" b="0" i="0" u="none" strike="noStrike" cap="none" normalizeH="0" baseline="0">
+              <a:rPr kumimoji="0" lang="nl-BE" altLang="nl-BE" sz="1600" b="0" i="0" u="none" strike="noStrike" cap="none" normalizeH="0" baseline="0" dirty="0">
                 <a:ln>
                   <a:noFill/>
                 </a:ln>
@@ -19834,7 +20526,7 @@
               <a:t>(x**</a:t>
             </a:r>
             <a:r>
-              <a:rPr kumimoji="0" lang="nl-BE" altLang="nl-BE" sz="1600" b="0" i="0" u="none" strike="noStrike" cap="none" normalizeH="0" baseline="0">
+              <a:rPr kumimoji="0" lang="nl-BE" altLang="nl-BE" sz="1600" b="0" i="0" u="none" strike="noStrike" cap="none" normalizeH="0" baseline="0" dirty="0">
                 <a:ln>
                   <a:noFill/>
                 </a:ln>
@@ -19847,7 +20539,7 @@
               <a:t>2 </a:t>
             </a:r>
             <a:r>
-              <a:rPr kumimoji="0" lang="nl-BE" altLang="nl-BE" sz="1600" b="0" i="0" u="none" strike="noStrike" cap="none" normalizeH="0" baseline="0" err="1">
+              <a:rPr kumimoji="0" lang="nl-BE" altLang="nl-BE" sz="1600" b="0" i="0" u="none" strike="noStrike" cap="none" normalizeH="0" baseline="0" dirty="0" err="1">
                 <a:ln>
                   <a:noFill/>
                 </a:ln>
@@ -19860,7 +20552,7 @@
               <a:t>for</a:t>
             </a:r>
             <a:r>
-              <a:rPr kumimoji="0" lang="nl-BE" altLang="nl-BE" sz="1600" b="0" i="0" u="none" strike="noStrike" cap="none" normalizeH="0" baseline="0">
+              <a:rPr kumimoji="0" lang="nl-BE" altLang="nl-BE" sz="1600" b="0" i="0" u="none" strike="noStrike" cap="none" normalizeH="0" baseline="0" dirty="0">
                 <a:ln>
                   <a:noFill/>
                 </a:ln>
@@ -19873,7 +20565,7 @@
               <a:t> </a:t>
             </a:r>
             <a:r>
-              <a:rPr kumimoji="0" lang="nl-BE" altLang="nl-BE" sz="1600" b="0" i="0" u="none" strike="noStrike" cap="none" normalizeH="0" baseline="0">
+              <a:rPr kumimoji="0" lang="nl-BE" altLang="nl-BE" sz="1600" b="0" i="0" u="none" strike="noStrike" cap="none" normalizeH="0" baseline="0" dirty="0">
                 <a:ln>
                   <a:noFill/>
                 </a:ln>
@@ -19886,7 +20578,7 @@
               <a:t>x </a:t>
             </a:r>
             <a:r>
-              <a:rPr kumimoji="0" lang="nl-BE" altLang="nl-BE" sz="1600" b="0" i="0" u="none" strike="noStrike" cap="none" normalizeH="0" baseline="0">
+              <a:rPr kumimoji="0" lang="nl-BE" altLang="nl-BE" sz="1600" b="0" i="0" u="none" strike="noStrike" cap="none" normalizeH="0" baseline="0" dirty="0">
                 <a:ln>
                   <a:noFill/>
                 </a:ln>
@@ -19899,7 +20591,7 @@
               <a:t>in </a:t>
             </a:r>
             <a:r>
-              <a:rPr kumimoji="0" lang="nl-BE" altLang="nl-BE" sz="1600" b="0" i="0" u="none" strike="noStrike" cap="none" normalizeH="0" baseline="0">
+              <a:rPr kumimoji="0" lang="nl-BE" altLang="nl-BE" sz="1600" b="0" i="0" u="none" strike="noStrike" cap="none" normalizeH="0" baseline="0" dirty="0">
                 <a:ln>
                   <a:noFill/>
                 </a:ln>
@@ -19912,7 +20604,7 @@
               <a:t>range</a:t>
             </a:r>
             <a:r>
-              <a:rPr kumimoji="0" lang="nl-BE" altLang="nl-BE" sz="1600" b="0" i="0" u="none" strike="noStrike" cap="none" normalizeH="0" baseline="0">
+              <a:rPr kumimoji="0" lang="nl-BE" altLang="nl-BE" sz="1600" b="0" i="0" u="none" strike="noStrike" cap="none" normalizeH="0" baseline="0" dirty="0">
                 <a:ln>
                   <a:noFill/>
                 </a:ln>
@@ -19925,7 +20617,7 @@
               <a:t>(</a:t>
             </a:r>
             <a:r>
-              <a:rPr kumimoji="0" lang="nl-BE" altLang="nl-BE" sz="1600" b="0" i="0" u="none" strike="noStrike" cap="none" normalizeH="0" baseline="0">
+              <a:rPr kumimoji="0" lang="nl-BE" altLang="nl-BE" sz="1600" b="0" i="0" u="none" strike="noStrike" cap="none" normalizeH="0" baseline="0" dirty="0">
                 <a:ln>
                   <a:noFill/>
                 </a:ln>
@@ -19938,7 +20630,7 @@
               <a:t>10</a:t>
             </a:r>
             <a:r>
-              <a:rPr kumimoji="0" lang="nl-BE" altLang="nl-BE" sz="1600" b="0" i="0" u="none" strike="noStrike" cap="none" normalizeH="0" baseline="0">
+              <a:rPr kumimoji="0" lang="nl-BE" altLang="nl-BE" sz="1600" b="0" i="0" u="none" strike="noStrike" cap="none" normalizeH="0" baseline="0" dirty="0">
                 <a:ln>
                   <a:noFill/>
                 </a:ln>
@@ -19951,7 +20643,7 @@
               <a:t>))</a:t>
             </a:r>
             <a:br>
-              <a:rPr kumimoji="0" lang="nl-BE" altLang="nl-BE" sz="1600" b="0" i="0" u="none" strike="noStrike" cap="none" normalizeH="0" baseline="0">
+              <a:rPr kumimoji="0" lang="nl-BE" altLang="nl-BE" sz="1600" b="0" i="0" u="none" strike="noStrike" cap="none" normalizeH="0" baseline="0" dirty="0">
                 <a:ln>
                   <a:noFill/>
                 </a:ln>
@@ -19963,7 +20655,7 @@
               </a:rPr>
             </a:br>
             <a:br>
-              <a:rPr kumimoji="0" lang="nl-BE" altLang="nl-BE" sz="1600" b="0" i="0" u="none" strike="noStrike" cap="none" normalizeH="0" baseline="0">
+              <a:rPr kumimoji="0" lang="nl-BE" altLang="nl-BE" sz="1600" b="0" i="0" u="none" strike="noStrike" cap="none" normalizeH="0" baseline="0" dirty="0">
                 <a:ln>
                   <a:noFill/>
                 </a:ln>
@@ -19975,7 +20667,7 @@
               </a:rPr>
             </a:br>
             <a:r>
-              <a:rPr kumimoji="0" lang="nl-BE" altLang="nl-BE" sz="1600" b="0" i="0" u="none" strike="noStrike" cap="none" normalizeH="0" baseline="0">
+              <a:rPr kumimoji="0" lang="nl-BE" altLang="nl-BE" sz="1600" b="0" i="0" u="none" strike="noStrike" cap="none" normalizeH="0" baseline="0" dirty="0">
                 <a:ln>
                   <a:noFill/>
                 </a:ln>
@@ -19988,7 +20680,7 @@
               <a:t>print</a:t>
             </a:r>
             <a:r>
-              <a:rPr kumimoji="0" lang="nl-BE" altLang="nl-BE" sz="1600" b="0" i="0" u="none" strike="noStrike" cap="none" normalizeH="0" baseline="0">
+              <a:rPr kumimoji="0" lang="nl-BE" altLang="nl-BE" sz="1600" b="0" i="0" u="none" strike="noStrike" cap="none" normalizeH="0" baseline="0" dirty="0">
                 <a:ln>
                   <a:noFill/>
                 </a:ln>
@@ -20001,7 +20693,7 @@
               <a:t>(</a:t>
             </a:r>
             <a:r>
-              <a:rPr kumimoji="0" lang="nl-BE" altLang="nl-BE" sz="1600" b="0" i="0" u="none" strike="noStrike" cap="none" normalizeH="0" baseline="0" err="1">
+              <a:rPr kumimoji="0" lang="nl-BE" altLang="nl-BE" sz="1600" b="0" i="0" u="none" strike="noStrike" cap="none" normalizeH="0" baseline="0" dirty="0" err="1">
                 <a:ln>
                   <a:noFill/>
                 </a:ln>
@@ -20014,7 +20706,7 @@
               <a:t>numbers</a:t>
             </a:r>
             <a:r>
-              <a:rPr kumimoji="0" lang="nl-BE" altLang="nl-BE" sz="1600" b="0" i="0" u="none" strike="noStrike" cap="none" normalizeH="0" baseline="0">
+              <a:rPr kumimoji="0" lang="nl-BE" altLang="nl-BE" sz="1600" b="0" i="0" u="none" strike="noStrike" cap="none" normalizeH="0" baseline="0" dirty="0">
                 <a:ln>
                   <a:noFill/>
                 </a:ln>
@@ -20027,7 +20719,7 @@
               <a:t>)</a:t>
             </a:r>
             <a:br>
-              <a:rPr kumimoji="0" lang="nl-BE" altLang="nl-BE" sz="1600" b="0" i="0" u="none" strike="noStrike" cap="none" normalizeH="0" baseline="0">
+              <a:rPr kumimoji="0" lang="nl-BE" altLang="nl-BE" sz="1600" b="0" i="0" u="none" strike="noStrike" cap="none" normalizeH="0" baseline="0" dirty="0">
                 <a:ln>
                   <a:noFill/>
                 </a:ln>
@@ -20039,7 +20731,7 @@
               </a:rPr>
             </a:br>
             <a:r>
-              <a:rPr kumimoji="0" lang="nl-BE" altLang="nl-BE" sz="1600" b="0" i="0" u="none" strike="noStrike" cap="none" normalizeH="0" baseline="0">
+              <a:rPr kumimoji="0" lang="nl-BE" altLang="nl-BE" sz="1600" b="0" i="0" u="none" strike="noStrike" cap="none" normalizeH="0" baseline="0" dirty="0">
                 <a:ln>
                   <a:noFill/>
                 </a:ln>
@@ -20052,7 +20744,7 @@
               <a:t>print</a:t>
             </a:r>
             <a:r>
-              <a:rPr kumimoji="0" lang="nl-BE" altLang="nl-BE" sz="1600" b="0" i="0" u="none" strike="noStrike" cap="none" normalizeH="0" baseline="0">
+              <a:rPr kumimoji="0" lang="nl-BE" altLang="nl-BE" sz="1600" b="0" i="0" u="none" strike="noStrike" cap="none" normalizeH="0" baseline="0" dirty="0">
                 <a:ln>
                   <a:noFill/>
                 </a:ln>
@@ -20065,7 +20757,7 @@
               <a:t>(</a:t>
             </a:r>
             <a:r>
-              <a:rPr kumimoji="0" lang="nl-BE" altLang="nl-BE" sz="1600" b="0" i="0" u="none" strike="noStrike" cap="none" normalizeH="0" baseline="0" err="1">
+              <a:rPr kumimoji="0" lang="nl-BE" altLang="nl-BE" sz="1600" b="0" i="0" u="none" strike="noStrike" cap="none" normalizeH="0" baseline="0" dirty="0" err="1">
                 <a:ln>
                   <a:noFill/>
                 </a:ln>
@@ -20078,7 +20770,7 @@
               <a:t>french_letters</a:t>
             </a:r>
             <a:r>
-              <a:rPr kumimoji="0" lang="nl-BE" altLang="nl-BE" sz="1600" b="0" i="0" u="none" strike="noStrike" cap="none" normalizeH="0" baseline="0">
+              <a:rPr kumimoji="0" lang="nl-BE" altLang="nl-BE" sz="1600" b="0" i="0" u="none" strike="noStrike" cap="none" normalizeH="0" baseline="0" dirty="0">
                 <a:ln>
                   <a:noFill/>
                 </a:ln>
@@ -20091,7 +20783,7 @@
               <a:t>)</a:t>
             </a:r>
             <a:br>
-              <a:rPr kumimoji="0" lang="nl-BE" altLang="nl-BE" sz="1600" b="0" i="0" u="none" strike="noStrike" cap="none" normalizeH="0" baseline="0">
+              <a:rPr kumimoji="0" lang="nl-BE" altLang="nl-BE" sz="1600" b="0" i="0" u="none" strike="noStrike" cap="none" normalizeH="0" baseline="0" dirty="0">
                 <a:ln>
                   <a:noFill/>
                 </a:ln>
@@ -20103,7 +20795,7 @@
               </a:rPr>
             </a:br>
             <a:r>
-              <a:rPr kumimoji="0" lang="nl-BE" altLang="nl-BE" sz="1600" b="0" i="0" u="none" strike="noStrike" cap="none" normalizeH="0" baseline="0">
+              <a:rPr kumimoji="0" lang="nl-BE" altLang="nl-BE" sz="1600" b="0" i="0" u="none" strike="noStrike" cap="none" normalizeH="0" baseline="0" dirty="0">
                 <a:ln>
                   <a:noFill/>
                 </a:ln>
@@ -20116,7 +20808,7 @@
               <a:t>print</a:t>
             </a:r>
             <a:r>
-              <a:rPr kumimoji="0" lang="nl-BE" altLang="nl-BE" sz="1600" b="0" i="0" u="none" strike="noStrike" cap="none" normalizeH="0" baseline="0">
+              <a:rPr kumimoji="0" lang="nl-BE" altLang="nl-BE" sz="1600" b="0" i="0" u="none" strike="noStrike" cap="none" normalizeH="0" baseline="0" dirty="0">
                 <a:ln>
                   <a:noFill/>
                 </a:ln>
@@ -20129,7 +20821,7 @@
               <a:t>(</a:t>
             </a:r>
             <a:r>
-              <a:rPr kumimoji="0" lang="nl-BE" altLang="nl-BE" sz="1600" b="0" i="0" u="none" strike="noStrike" cap="none" normalizeH="0" baseline="0" err="1">
+              <a:rPr kumimoji="0" lang="nl-BE" altLang="nl-BE" sz="1600" b="0" i="0" u="none" strike="noStrike" cap="none" normalizeH="0" baseline="0" dirty="0" err="1">
                 <a:ln>
                   <a:noFill/>
                 </a:ln>
@@ -20142,7 +20834,7 @@
               <a:t>vowels</a:t>
             </a:r>
             <a:r>
-              <a:rPr kumimoji="0" lang="nl-BE" altLang="nl-BE" sz="1600" b="0" i="0" u="none" strike="noStrike" cap="none" normalizeH="0" baseline="0">
+              <a:rPr kumimoji="0" lang="nl-BE" altLang="nl-BE" sz="1600" b="0" i="0" u="none" strike="noStrike" cap="none" normalizeH="0" baseline="0" dirty="0">
                 <a:ln>
                   <a:noFill/>
                 </a:ln>
@@ -20155,7 +20847,7 @@
               <a:t>)</a:t>
             </a:r>
             <a:br>
-              <a:rPr kumimoji="0" lang="nl-BE" altLang="nl-BE" sz="1600" b="0" i="0" u="none" strike="noStrike" cap="none" normalizeH="0" baseline="0">
+              <a:rPr kumimoji="0" lang="nl-BE" altLang="nl-BE" sz="1600" b="0" i="0" u="none" strike="noStrike" cap="none" normalizeH="0" baseline="0" dirty="0">
                 <a:ln>
                   <a:noFill/>
                 </a:ln>
@@ -20167,7 +20859,7 @@
               </a:rPr>
             </a:br>
             <a:r>
-              <a:rPr kumimoji="0" lang="nl-BE" altLang="nl-BE" sz="1600" b="0" i="0" u="none" strike="noStrike" cap="none" normalizeH="0" baseline="0">
+              <a:rPr kumimoji="0" lang="nl-BE" altLang="nl-BE" sz="1600" b="0" i="0" u="none" strike="noStrike" cap="none" normalizeH="0" baseline="0" dirty="0">
                 <a:ln>
                   <a:noFill/>
                 </a:ln>
@@ -20180,7 +20872,7 @@
               <a:t>print</a:t>
             </a:r>
             <a:r>
-              <a:rPr kumimoji="0" lang="nl-BE" altLang="nl-BE" sz="1600" b="0" i="0" u="none" strike="noStrike" cap="none" normalizeH="0" baseline="0">
+              <a:rPr kumimoji="0" lang="nl-BE" altLang="nl-BE" sz="1600" b="0" i="0" u="none" strike="noStrike" cap="none" normalizeH="0" baseline="0" dirty="0">
                 <a:ln>
                   <a:noFill/>
                 </a:ln>
@@ -20192,7 +20884,7 @@
               </a:rPr>
               <a:t>(squares)</a:t>
             </a:r>
-            <a:endParaRPr kumimoji="0" lang="nl-BE" altLang="nl-BE" sz="3600" b="0" i="0" u="none" strike="noStrike" cap="none" normalizeH="0" baseline="0">
+            <a:endParaRPr kumimoji="0" lang="nl-BE" altLang="nl-BE" sz="3600" b="0" i="0" u="none" strike="noStrike" cap="none" normalizeH="0" baseline="0" dirty="0">
               <a:ln>
                 <a:noFill/>
               </a:ln>
@@ -20273,35 +20965,136 @@
           <a:lstStyle/>
           <a:p>
             <a:r>
-              <a:rPr lang="nl-NL"/>
-              <a:t>You can go through a set with a </a:t>
-            </a:r>
-            <a:r>
-              <a:rPr lang="nl-NL" err="1"/>
+              <a:rPr lang="nl-NL" dirty="0" err="1"/>
+              <a:t>You</a:t>
+            </a:r>
+            <a:r>
+              <a:rPr lang="nl-NL" dirty="0"/>
+              <a:t> </a:t>
+            </a:r>
+            <a:r>
+              <a:rPr lang="nl-NL" dirty="0" err="1"/>
+              <a:t>can</a:t>
+            </a:r>
+            <a:r>
+              <a:rPr lang="nl-NL" dirty="0"/>
+              <a:t> go </a:t>
+            </a:r>
+            <a:r>
+              <a:rPr lang="nl-NL" dirty="0" err="1"/>
+              <a:t>through</a:t>
+            </a:r>
+            <a:r>
+              <a:rPr lang="nl-NL" dirty="0"/>
+              <a:t> a set </a:t>
+            </a:r>
+            <a:r>
+              <a:rPr lang="nl-NL" dirty="0" err="1"/>
+              <a:t>with</a:t>
+            </a:r>
+            <a:r>
+              <a:rPr lang="nl-NL" dirty="0"/>
+              <a:t> a </a:t>
+            </a:r>
+            <a:r>
+              <a:rPr lang="nl-NL" dirty="0" err="1"/>
               <a:t>for</a:t>
             </a:r>
             <a:r>
-              <a:rPr lang="nl-NL"/>
+              <a:rPr lang="nl-NL" dirty="0"/>
               <a:t> loop</a:t>
             </a:r>
           </a:p>
           <a:p>
             <a:r>
-              <a:rPr lang="nl-NL"/>
-              <a:t>There is no way to determine the order in which you will see the elements</a:t>
-            </a:r>
-          </a:p>
-          <a:p>
-            <a:r>
-              <a:rPr lang="nl-NL" err="1"/>
+              <a:rPr lang="nl-NL" dirty="0" err="1"/>
+              <a:t>There</a:t>
+            </a:r>
+            <a:r>
+              <a:rPr lang="nl-NL" dirty="0"/>
+              <a:t> is no way </a:t>
+            </a:r>
+            <a:r>
+              <a:rPr lang="nl-NL" dirty="0" err="1"/>
+              <a:t>to</a:t>
+            </a:r>
+            <a:r>
+              <a:rPr lang="nl-NL" dirty="0"/>
+              <a:t> </a:t>
+            </a:r>
+            <a:r>
+              <a:rPr lang="nl-NL" dirty="0" err="1"/>
+              <a:t>determine</a:t>
+            </a:r>
+            <a:r>
+              <a:rPr lang="nl-NL" dirty="0"/>
+              <a:t> </a:t>
+            </a:r>
+            <a:r>
+              <a:rPr lang="nl-NL" dirty="0" err="1"/>
+              <a:t>the</a:t>
+            </a:r>
+            <a:r>
+              <a:rPr lang="nl-NL" dirty="0"/>
+              <a:t> order in </a:t>
+            </a:r>
+            <a:r>
+              <a:rPr lang="nl-NL" dirty="0" err="1"/>
+              <a:t>which</a:t>
+            </a:r>
+            <a:r>
+              <a:rPr lang="nl-NL" dirty="0"/>
+              <a:t> </a:t>
+            </a:r>
+            <a:r>
+              <a:rPr lang="nl-NL" dirty="0" err="1"/>
+              <a:t>you</a:t>
+            </a:r>
+            <a:r>
+              <a:rPr lang="nl-NL" dirty="0"/>
+              <a:t> </a:t>
+            </a:r>
+            <a:r>
+              <a:rPr lang="nl-NL" dirty="0" err="1"/>
+              <a:t>will</a:t>
+            </a:r>
+            <a:r>
+              <a:rPr lang="nl-NL" dirty="0"/>
+              <a:t> </a:t>
+            </a:r>
+            <a:r>
+              <a:rPr lang="nl-NL" dirty="0" err="1"/>
+              <a:t>see</a:t>
+            </a:r>
+            <a:r>
+              <a:rPr lang="nl-NL" dirty="0"/>
+              <a:t> </a:t>
+            </a:r>
+            <a:r>
+              <a:rPr lang="nl-NL" dirty="0" err="1"/>
+              <a:t>the</a:t>
+            </a:r>
+            <a:r>
+              <a:rPr lang="nl-NL" dirty="0"/>
+              <a:t> </a:t>
+            </a:r>
+            <a:r>
+              <a:rPr lang="nl-NL" dirty="0" err="1"/>
+              <a:t>elements</a:t>
+            </a:r>
+            <a:endParaRPr lang="nl-NL" dirty="0"/>
+          </a:p>
+          <a:p>
+            <a:r>
+              <a:rPr lang="nl-NL" dirty="0" err="1"/>
               <a:t>With</a:t>
             </a:r>
             <a:r>
-              <a:rPr lang="nl-NL"/>
+              <a:rPr lang="nl-NL" dirty="0"/>
               <a:t> </a:t>
             </a:r>
             <a:r>
-              <a:rPr lang="nl-NL" sz="2400" b="1" err="1">
+              <a:rPr lang="nl-NL" sz="2400" b="1" dirty="0" err="1">
                 <a:solidFill>
                   <a:srgbClr val="000000"/>
                 </a:solidFill>
@@ -20311,7 +21104,7 @@
               <a:t>len</a:t>
             </a:r>
             <a:r>
-              <a:rPr lang="nl-NL" sz="2400" b="1">
+              <a:rPr lang="nl-NL" sz="2400" b="1" dirty="0">
                 <a:solidFill>
                   <a:srgbClr val="000000"/>
                 </a:solidFill>
@@ -20321,8 +21114,48 @@
               <a:t>()</a:t>
             </a:r>
             <a:r>
-              <a:rPr lang="nl-NL"/>
-              <a:t> you can print the size of the set</a:t>
+              <a:rPr lang="nl-NL" dirty="0"/>
+              <a:t> </a:t>
+            </a:r>
+            <a:r>
+              <a:rPr lang="nl-NL" dirty="0" err="1"/>
+              <a:t>you</a:t>
+            </a:r>
+            <a:r>
+              <a:rPr lang="nl-NL" dirty="0"/>
+              <a:t> </a:t>
+            </a:r>
+            <a:r>
+              <a:rPr lang="nl-NL" dirty="0" err="1"/>
+              <a:t>can</a:t>
+            </a:r>
+            <a:r>
+              <a:rPr lang="nl-NL" dirty="0"/>
+              <a:t> print </a:t>
+            </a:r>
+            <a:r>
+              <a:rPr lang="nl-NL" dirty="0" err="1"/>
+              <a:t>the</a:t>
+            </a:r>
+            <a:r>
+              <a:rPr lang="nl-NL" dirty="0"/>
+              <a:t> </a:t>
+            </a:r>
+            <a:r>
+              <a:rPr lang="nl-NL" dirty="0" err="1"/>
+              <a:t>size</a:t>
+            </a:r>
+            <a:r>
+              <a:rPr lang="nl-NL" dirty="0"/>
+              <a:t> of </a:t>
+            </a:r>
+            <a:r>
+              <a:rPr lang="nl-NL" dirty="0" err="1"/>
+              <a:t>the</a:t>
+            </a:r>
+            <a:r>
+              <a:rPr lang="nl-NL" dirty="0"/>
+              <a:t> set</a:t>
             </a:r>
           </a:p>
         </p:txBody>
@@ -20517,7 +21350,7 @@
               <a:tabLst/>
             </a:pPr>
             <a:r>
-              <a:rPr kumimoji="0" lang="nl-BE" altLang="nl-BE" sz="2000" b="0" i="0" u="none" strike="noStrike" cap="none" normalizeH="0" baseline="0" err="1">
+              <a:rPr kumimoji="0" lang="nl-BE" altLang="nl-BE" sz="2000" b="0" i="0" u="none" strike="noStrike" cap="none" normalizeH="0" baseline="0" dirty="0" err="1">
                 <a:ln>
                   <a:noFill/>
                 </a:ln>
@@ -20530,7 +21363,7 @@
               <a:t>vegetables</a:t>
             </a:r>
             <a:r>
-              <a:rPr kumimoji="0" lang="nl-BE" altLang="nl-BE" sz="2000" b="0" i="0" u="none" strike="noStrike" cap="none" normalizeH="0" baseline="0">
+              <a:rPr kumimoji="0" lang="nl-BE" altLang="nl-BE" sz="2000" b="0" i="0" u="none" strike="noStrike" cap="none" normalizeH="0" baseline="0" dirty="0">
                 <a:ln>
                   <a:noFill/>
                 </a:ln>
@@ -20543,7 +21376,7 @@
               <a:t> = {</a:t>
             </a:r>
             <a:r>
-              <a:rPr kumimoji="0" lang="nl-BE" altLang="nl-BE" sz="2000" b="1" i="0" u="none" strike="noStrike" cap="none" normalizeH="0" baseline="0">
+              <a:rPr kumimoji="0" lang="nl-BE" altLang="nl-BE" sz="2000" b="1" i="0" u="none" strike="noStrike" cap="none" normalizeH="0" baseline="0" dirty="0">
                 <a:ln>
                   <a:noFill/>
                 </a:ln>
@@ -20556,7 +21389,7 @@
               <a:t>"leek"</a:t>
             </a:r>
             <a:r>
-              <a:rPr kumimoji="0" lang="nl-BE" altLang="nl-BE" sz="2000" b="0" i="0" u="none" strike="noStrike" cap="none" normalizeH="0" baseline="0">
+              <a:rPr kumimoji="0" lang="nl-BE" altLang="nl-BE" sz="2000" b="0" i="0" u="none" strike="noStrike" cap="none" normalizeH="0" baseline="0" dirty="0">
                 <a:ln>
                   <a:noFill/>
                 </a:ln>
@@ -20569,7 +21402,7 @@
               <a:t>, </a:t>
             </a:r>
             <a:r>
-              <a:rPr kumimoji="0" lang="nl-BE" altLang="nl-BE" sz="2000" b="1" i="0" u="none" strike="noStrike" cap="none" normalizeH="0" baseline="0">
+              <a:rPr kumimoji="0" lang="nl-BE" altLang="nl-BE" sz="2000" b="1" i="0" u="none" strike="noStrike" cap="none" normalizeH="0" baseline="0" dirty="0">
                 <a:ln>
                   <a:noFill/>
                 </a:ln>
@@ -20582,7 +21415,7 @@
               <a:t>"</a:t>
             </a:r>
             <a:r>
-              <a:rPr kumimoji="0" lang="nl-BE" altLang="nl-BE" sz="2000" b="1" i="0" u="none" strike="noStrike" cap="none" normalizeH="0" baseline="0" err="1">
+              <a:rPr kumimoji="0" lang="nl-BE" altLang="nl-BE" sz="2000" b="1" i="0" u="none" strike="noStrike" cap="none" normalizeH="0" baseline="0" dirty="0" err="1">
                 <a:ln>
                   <a:noFill/>
                 </a:ln>
@@ -20595,7 +21428,7 @@
               <a:t>tomato</a:t>
             </a:r>
             <a:r>
-              <a:rPr kumimoji="0" lang="nl-BE" altLang="nl-BE" sz="2000" b="1" i="0" u="none" strike="noStrike" cap="none" normalizeH="0" baseline="0">
+              <a:rPr kumimoji="0" lang="nl-BE" altLang="nl-BE" sz="2000" b="1" i="0" u="none" strike="noStrike" cap="none" normalizeH="0" baseline="0" dirty="0">
                 <a:ln>
                   <a:noFill/>
                 </a:ln>
@@ -20608,7 +21441,7 @@
               <a:t>"</a:t>
             </a:r>
             <a:r>
-              <a:rPr kumimoji="0" lang="nl-BE" altLang="nl-BE" sz="2000" b="0" i="0" u="none" strike="noStrike" cap="none" normalizeH="0" baseline="0">
+              <a:rPr kumimoji="0" lang="nl-BE" altLang="nl-BE" sz="2000" b="0" i="0" u="none" strike="noStrike" cap="none" normalizeH="0" baseline="0" dirty="0">
                 <a:ln>
                   <a:noFill/>
                 </a:ln>
@@ -20621,7 +21454,7 @@
               <a:t>, </a:t>
             </a:r>
             <a:r>
-              <a:rPr kumimoji="0" lang="nl-BE" altLang="nl-BE" sz="2000" b="1" i="0" u="none" strike="noStrike" cap="none" normalizeH="0" baseline="0">
+              <a:rPr kumimoji="0" lang="nl-BE" altLang="nl-BE" sz="2000" b="1" i="0" u="none" strike="noStrike" cap="none" normalizeH="0" baseline="0" dirty="0">
                 <a:ln>
                   <a:noFill/>
                 </a:ln>
@@ -20634,7 +21467,7 @@
               <a:t>"</a:t>
             </a:r>
             <a:r>
-              <a:rPr kumimoji="0" lang="nl-BE" altLang="nl-BE" sz="2000" b="1" i="0" u="none" strike="noStrike" cap="none" normalizeH="0" baseline="0" err="1">
+              <a:rPr kumimoji="0" lang="nl-BE" altLang="nl-BE" sz="2000" b="1" i="0" u="none" strike="noStrike" cap="none" normalizeH="0" baseline="0" dirty="0" err="1">
                 <a:ln>
                   <a:noFill/>
                 </a:ln>
@@ -20647,7 +21480,7 @@
               <a:t>celery</a:t>
             </a:r>
             <a:r>
-              <a:rPr kumimoji="0" lang="nl-BE" altLang="nl-BE" sz="2000" b="1" i="0" u="none" strike="noStrike" cap="none" normalizeH="0" baseline="0">
+              <a:rPr kumimoji="0" lang="nl-BE" altLang="nl-BE" sz="2000" b="1" i="0" u="none" strike="noStrike" cap="none" normalizeH="0" baseline="0" dirty="0">
                 <a:ln>
                   <a:noFill/>
                 </a:ln>
@@ -20660,7 +21493,7 @@
               <a:t>"</a:t>
             </a:r>
             <a:r>
-              <a:rPr kumimoji="0" lang="nl-BE" altLang="nl-BE" sz="2000" b="0" i="0" u="none" strike="noStrike" cap="none" normalizeH="0" baseline="0">
+              <a:rPr kumimoji="0" lang="nl-BE" altLang="nl-BE" sz="2000" b="0" i="0" u="none" strike="noStrike" cap="none" normalizeH="0" baseline="0" dirty="0">
                 <a:ln>
                   <a:noFill/>
                 </a:ln>
@@ -20673,7 +21506,7 @@
               <a:t>, </a:t>
             </a:r>
             <a:r>
-              <a:rPr kumimoji="0" lang="nl-BE" altLang="nl-BE" sz="2000" b="1" i="0" u="none" strike="noStrike" cap="none" normalizeH="0" baseline="0">
+              <a:rPr kumimoji="0" lang="nl-BE" altLang="nl-BE" sz="2000" b="1" i="0" u="none" strike="noStrike" cap="none" normalizeH="0" baseline="0" dirty="0">
                 <a:ln>
                   <a:noFill/>
                 </a:ln>
@@ -20686,7 +21519,7 @@
               <a:t>"</a:t>
             </a:r>
             <a:r>
-              <a:rPr kumimoji="0" lang="nl-BE" altLang="nl-BE" sz="2000" b="1" i="0" u="none" strike="noStrike" cap="none" normalizeH="0" baseline="0" err="1">
+              <a:rPr kumimoji="0" lang="nl-BE" altLang="nl-BE" sz="2000" b="1" i="0" u="none" strike="noStrike" cap="none" normalizeH="0" baseline="0" dirty="0" err="1">
                 <a:ln>
                   <a:noFill/>
                 </a:ln>
@@ -20699,7 +21532,7 @@
               <a:t>endive</a:t>
             </a:r>
             <a:r>
-              <a:rPr kumimoji="0" lang="nl-BE" altLang="nl-BE" sz="2000" b="1" i="0" u="none" strike="noStrike" cap="none" normalizeH="0" baseline="0">
+              <a:rPr kumimoji="0" lang="nl-BE" altLang="nl-BE" sz="2000" b="1" i="0" u="none" strike="noStrike" cap="none" normalizeH="0" baseline="0" dirty="0">
                 <a:ln>
                   <a:noFill/>
                 </a:ln>
@@ -20712,7 +21545,7 @@
               <a:t>"</a:t>
             </a:r>
             <a:r>
-              <a:rPr kumimoji="0" lang="nl-BE" altLang="nl-BE" sz="2000" b="0" i="0" u="none" strike="noStrike" cap="none" normalizeH="0" baseline="0">
+              <a:rPr kumimoji="0" lang="nl-BE" altLang="nl-BE" sz="2000" b="0" i="0" u="none" strike="noStrike" cap="none" normalizeH="0" baseline="0" dirty="0">
                 <a:ln>
                   <a:noFill/>
                 </a:ln>
@@ -20725,7 +21558,7 @@
               <a:t>, </a:t>
             </a:r>
             <a:r>
-              <a:rPr kumimoji="0" lang="nl-BE" altLang="nl-BE" sz="2000" b="1" i="0" u="none" strike="noStrike" cap="none" normalizeH="0" baseline="0">
+              <a:rPr kumimoji="0" lang="nl-BE" altLang="nl-BE" sz="2000" b="1" i="0" u="none" strike="noStrike" cap="none" normalizeH="0" baseline="0" dirty="0">
                 <a:ln>
                   <a:noFill/>
                 </a:ln>
@@ -20738,7 +21571,7 @@
               <a:t>"</a:t>
             </a:r>
             <a:r>
-              <a:rPr kumimoji="0" lang="nl-BE" altLang="nl-BE" sz="2000" b="1" i="0" u="none" strike="noStrike" cap="none" normalizeH="0" baseline="0" err="1">
+              <a:rPr kumimoji="0" lang="nl-BE" altLang="nl-BE" sz="2000" b="1" i="0" u="none" strike="noStrike" cap="none" normalizeH="0" baseline="0" dirty="0" err="1">
                 <a:ln>
                   <a:noFill/>
                 </a:ln>
@@ -20751,7 +21584,7 @@
               <a:t>fennel</a:t>
             </a:r>
             <a:r>
-              <a:rPr kumimoji="0" lang="nl-BE" altLang="nl-BE" sz="2000" b="1" i="0" u="none" strike="noStrike" cap="none" normalizeH="0" baseline="0">
+              <a:rPr kumimoji="0" lang="nl-BE" altLang="nl-BE" sz="2000" b="1" i="0" u="none" strike="noStrike" cap="none" normalizeH="0" baseline="0" dirty="0">
                 <a:ln>
                   <a:noFill/>
                 </a:ln>
@@ -20764,7 +21597,7 @@
               <a:t>"</a:t>
             </a:r>
             <a:r>
-              <a:rPr kumimoji="0" lang="nl-BE" altLang="nl-BE" sz="2000" b="0" i="0" u="none" strike="noStrike" cap="none" normalizeH="0" baseline="0">
+              <a:rPr kumimoji="0" lang="nl-BE" altLang="nl-BE" sz="2000" b="0" i="0" u="none" strike="noStrike" cap="none" normalizeH="0" baseline="0" dirty="0">
                 <a:ln>
                   <a:noFill/>
                 </a:ln>
@@ -20777,7 +21610,7 @@
               <a:t>}</a:t>
             </a:r>
             <a:br>
-              <a:rPr kumimoji="0" lang="nl-BE" altLang="nl-BE" sz="2000" b="0" i="0" u="none" strike="noStrike" cap="none" normalizeH="0" baseline="0">
+              <a:rPr kumimoji="0" lang="nl-BE" altLang="nl-BE" sz="2000" b="0" i="0" u="none" strike="noStrike" cap="none" normalizeH="0" baseline="0" dirty="0">
                 <a:ln>
                   <a:noFill/>
                 </a:ln>
@@ -20789,7 +21622,7 @@
               </a:rPr>
             </a:br>
             <a:r>
-              <a:rPr kumimoji="0" lang="nl-BE" altLang="nl-BE" sz="2000" b="0" i="0" u="none" strike="noStrike" cap="none" normalizeH="0" baseline="0">
+              <a:rPr kumimoji="0" lang="nl-BE" altLang="nl-BE" sz="2000" b="0" i="0" u="none" strike="noStrike" cap="none" normalizeH="0" baseline="0" dirty="0">
                 <a:ln>
                   <a:noFill/>
                 </a:ln>
@@ -20802,7 +21635,7 @@
               <a:t>print</a:t>
             </a:r>
             <a:r>
-              <a:rPr kumimoji="0" lang="nl-BE" altLang="nl-BE" sz="2000" b="0" i="0" u="none" strike="noStrike" cap="none" normalizeH="0" baseline="0">
+              <a:rPr kumimoji="0" lang="nl-BE" altLang="nl-BE" sz="2000" b="0" i="0" u="none" strike="noStrike" cap="none" normalizeH="0" baseline="0" dirty="0">
                 <a:ln>
                   <a:noFill/>
                 </a:ln>
@@ -20815,7 +21648,7 @@
               <a:t>(</a:t>
             </a:r>
             <a:r>
-              <a:rPr kumimoji="0" lang="nl-BE" altLang="nl-BE" sz="2000" b="1" i="0" u="none" strike="noStrike" cap="none" normalizeH="0" baseline="0">
+              <a:rPr kumimoji="0" lang="nl-BE" altLang="nl-BE" sz="2000" b="1" i="0" u="none" strike="noStrike" cap="none" normalizeH="0" baseline="0" dirty="0">
                 <a:ln>
                   <a:noFill/>
                 </a:ln>
@@ -20828,7 +21661,7 @@
               <a:t>'The set </a:t>
             </a:r>
             <a:r>
-              <a:rPr kumimoji="0" lang="nl-BE" altLang="nl-BE" sz="2000" b="1" i="0" u="none" strike="noStrike" cap="none" normalizeH="0" baseline="0" err="1">
+              <a:rPr kumimoji="0" lang="nl-BE" altLang="nl-BE" sz="2000" b="1" i="0" u="none" strike="noStrike" cap="none" normalizeH="0" baseline="0" dirty="0" err="1">
                 <a:ln>
                   <a:noFill/>
                 </a:ln>
@@ -20841,7 +21674,7 @@
               <a:t>contains</a:t>
             </a:r>
             <a:r>
-              <a:rPr kumimoji="0" lang="nl-BE" altLang="nl-BE" sz="2000" b="1" i="0" u="none" strike="noStrike" cap="none" normalizeH="0" baseline="0">
+              <a:rPr kumimoji="0" lang="nl-BE" altLang="nl-BE" sz="2000" b="1" i="0" u="none" strike="noStrike" cap="none" normalizeH="0" baseline="0" dirty="0">
                 <a:ln>
                   <a:noFill/>
                 </a:ln>
@@ -20854,7 +21687,7 @@
               <a:t>'</a:t>
             </a:r>
             <a:r>
-              <a:rPr kumimoji="0" lang="nl-BE" altLang="nl-BE" sz="2000" b="0" i="0" u="none" strike="noStrike" cap="none" normalizeH="0" baseline="0">
+              <a:rPr kumimoji="0" lang="nl-BE" altLang="nl-BE" sz="2000" b="0" i="0" u="none" strike="noStrike" cap="none" normalizeH="0" baseline="0" dirty="0">
                 <a:ln>
                   <a:noFill/>
                 </a:ln>
@@ -20867,7 +21700,7 @@
               <a:t>, </a:t>
             </a:r>
             <a:r>
-              <a:rPr kumimoji="0" lang="nl-BE" altLang="nl-BE" sz="2000" b="0" i="0" u="none" strike="noStrike" cap="none" normalizeH="0" baseline="0" err="1">
+              <a:rPr kumimoji="0" lang="nl-BE" altLang="nl-BE" sz="2000" b="0" i="0" u="none" strike="noStrike" cap="none" normalizeH="0" baseline="0" dirty="0" err="1">
                 <a:ln>
                   <a:noFill/>
                 </a:ln>
@@ -20880,7 +21713,7 @@
               <a:t>len</a:t>
             </a:r>
             <a:r>
-              <a:rPr kumimoji="0" lang="nl-BE" altLang="nl-BE" sz="2000" b="0" i="0" u="none" strike="noStrike" cap="none" normalizeH="0" baseline="0">
+              <a:rPr kumimoji="0" lang="nl-BE" altLang="nl-BE" sz="2000" b="0" i="0" u="none" strike="noStrike" cap="none" normalizeH="0" baseline="0" dirty="0">
                 <a:ln>
                   <a:noFill/>
                 </a:ln>
@@ -20893,7 +21726,7 @@
               <a:t>(</a:t>
             </a:r>
             <a:r>
-              <a:rPr kumimoji="0" lang="nl-BE" altLang="nl-BE" sz="2000" b="0" i="0" u="none" strike="noStrike" cap="none" normalizeH="0" baseline="0" err="1">
+              <a:rPr kumimoji="0" lang="nl-BE" altLang="nl-BE" sz="2000" b="0" i="0" u="none" strike="noStrike" cap="none" normalizeH="0" baseline="0" dirty="0" err="1">
                 <a:ln>
                   <a:noFill/>
                 </a:ln>
@@ -20906,7 +21739,7 @@
               <a:t>vegetables</a:t>
             </a:r>
             <a:r>
-              <a:rPr kumimoji="0" lang="nl-BE" altLang="nl-BE" sz="2000" b="0" i="0" u="none" strike="noStrike" cap="none" normalizeH="0" baseline="0">
+              <a:rPr kumimoji="0" lang="nl-BE" altLang="nl-BE" sz="2000" b="0" i="0" u="none" strike="noStrike" cap="none" normalizeH="0" baseline="0" dirty="0">
                 <a:ln>
                   <a:noFill/>
                 </a:ln>
@@ -20919,7 +21752,7 @@
               <a:t>), </a:t>
             </a:r>
             <a:r>
-              <a:rPr kumimoji="0" lang="nl-BE" altLang="nl-BE" sz="2000" b="1" i="0" u="none" strike="noStrike" cap="none" normalizeH="0" baseline="0">
+              <a:rPr kumimoji="0" lang="nl-BE" altLang="nl-BE" sz="2000" b="1" i="0" u="none" strike="noStrike" cap="none" normalizeH="0" baseline="0" dirty="0">
                 <a:ln>
                   <a:noFill/>
                 </a:ln>
@@ -20932,7 +21765,7 @@
               <a:t>'</a:t>
             </a:r>
             <a:r>
-              <a:rPr kumimoji="0" lang="nl-BE" altLang="nl-BE" sz="2000" b="1" i="0" u="none" strike="noStrike" cap="none" normalizeH="0" baseline="0" err="1">
+              <a:rPr kumimoji="0" lang="nl-BE" altLang="nl-BE" sz="2000" b="1" i="0" u="none" strike="noStrike" cap="none" normalizeH="0" baseline="0" dirty="0" err="1">
                 <a:ln>
                   <a:noFill/>
                 </a:ln>
@@ -20945,7 +21778,7 @@
               <a:t>elements</a:t>
             </a:r>
             <a:r>
-              <a:rPr kumimoji="0" lang="nl-BE" altLang="nl-BE" sz="2000" b="1" i="0" u="none" strike="noStrike" cap="none" normalizeH="0" baseline="0">
+              <a:rPr kumimoji="0" lang="nl-BE" altLang="nl-BE" sz="2000" b="1" i="0" u="none" strike="noStrike" cap="none" normalizeH="0" baseline="0" dirty="0">
                 <a:ln>
                   <a:noFill/>
                 </a:ln>
@@ -20958,7 +21791,7 @@
               <a:t>'</a:t>
             </a:r>
             <a:r>
-              <a:rPr kumimoji="0" lang="nl-BE" altLang="nl-BE" sz="2000" b="0" i="0" u="none" strike="noStrike" cap="none" normalizeH="0" baseline="0">
+              <a:rPr kumimoji="0" lang="nl-BE" altLang="nl-BE" sz="2000" b="0" i="0" u="none" strike="noStrike" cap="none" normalizeH="0" baseline="0" dirty="0">
                 <a:ln>
                   <a:noFill/>
                 </a:ln>
@@ -20971,7 +21804,7 @@
               <a:t>)</a:t>
             </a:r>
             <a:br>
-              <a:rPr kumimoji="0" lang="nl-BE" altLang="nl-BE" sz="2000" b="0" i="0" u="none" strike="noStrike" cap="none" normalizeH="0" baseline="0">
+              <a:rPr kumimoji="0" lang="nl-BE" altLang="nl-BE" sz="2000" b="0" i="0" u="none" strike="noStrike" cap="none" normalizeH="0" baseline="0" dirty="0">
                 <a:ln>
                   <a:noFill/>
                 </a:ln>
@@ -20983,7 +21816,7 @@
               </a:rPr>
             </a:br>
             <a:r>
-              <a:rPr kumimoji="0" lang="nl-BE" altLang="nl-BE" sz="2000" b="0" i="0" u="none" strike="noStrike" cap="none" normalizeH="0" baseline="0" err="1">
+              <a:rPr kumimoji="0" lang="nl-BE" altLang="nl-BE" sz="2000" b="0" i="0" u="none" strike="noStrike" cap="none" normalizeH="0" baseline="0" dirty="0" err="1">
                 <a:ln>
                   <a:noFill/>
                 </a:ln>
@@ -20996,7 +21829,7 @@
               <a:t>for</a:t>
             </a:r>
             <a:r>
-              <a:rPr kumimoji="0" lang="nl-BE" altLang="nl-BE" sz="2000" b="0" i="0" u="none" strike="noStrike" cap="none" normalizeH="0" baseline="0">
+              <a:rPr kumimoji="0" lang="nl-BE" altLang="nl-BE" sz="2000" b="0" i="0" u="none" strike="noStrike" cap="none" normalizeH="0" baseline="0" dirty="0">
                 <a:ln>
                   <a:noFill/>
                 </a:ln>
@@ -21009,7 +21842,7 @@
               <a:t> </a:t>
             </a:r>
             <a:r>
-              <a:rPr kumimoji="0" lang="nl-BE" altLang="nl-BE" sz="2000" b="0" i="0" u="none" strike="noStrike" cap="none" normalizeH="0" baseline="0">
+              <a:rPr kumimoji="0" lang="nl-BE" altLang="nl-BE" sz="2000" b="0" i="0" u="none" strike="noStrike" cap="none" normalizeH="0" baseline="0" dirty="0">
                 <a:ln>
                   <a:noFill/>
                 </a:ln>
@@ -21022,7 +21855,7 @@
               <a:t>element </a:t>
             </a:r>
             <a:r>
-              <a:rPr kumimoji="0" lang="nl-BE" altLang="nl-BE" sz="2000" b="0" i="0" u="none" strike="noStrike" cap="none" normalizeH="0" baseline="0">
+              <a:rPr kumimoji="0" lang="nl-BE" altLang="nl-BE" sz="2000" b="0" i="0" u="none" strike="noStrike" cap="none" normalizeH="0" baseline="0" dirty="0">
                 <a:ln>
                   <a:noFill/>
                 </a:ln>
@@ -21035,7 +21868,7 @@
               <a:t>in </a:t>
             </a:r>
             <a:r>
-              <a:rPr kumimoji="0" lang="nl-BE" altLang="nl-BE" sz="2000" b="0" i="0" u="none" strike="noStrike" cap="none" normalizeH="0" baseline="0" err="1">
+              <a:rPr kumimoji="0" lang="nl-BE" altLang="nl-BE" sz="2000" b="0" i="0" u="none" strike="noStrike" cap="none" normalizeH="0" baseline="0" dirty="0" err="1">
                 <a:ln>
                   <a:noFill/>
                 </a:ln>
@@ -21048,7 +21881,7 @@
               <a:t>vegetables</a:t>
             </a:r>
             <a:r>
-              <a:rPr kumimoji="0" lang="nl-BE" altLang="nl-BE" sz="2000" b="0" i="0" u="none" strike="noStrike" cap="none" normalizeH="0" baseline="0">
+              <a:rPr kumimoji="0" lang="nl-BE" altLang="nl-BE" sz="2000" b="0" i="0" u="none" strike="noStrike" cap="none" normalizeH="0" baseline="0" dirty="0">
                 <a:ln>
                   <a:noFill/>
                 </a:ln>
@@ -21061,7 +21894,7 @@
               <a:t>:</a:t>
             </a:r>
             <a:br>
-              <a:rPr kumimoji="0" lang="nl-BE" altLang="nl-BE" sz="2000" b="0" i="0" u="none" strike="noStrike" cap="none" normalizeH="0" baseline="0">
+              <a:rPr kumimoji="0" lang="nl-BE" altLang="nl-BE" sz="2000" b="0" i="0" u="none" strike="noStrike" cap="none" normalizeH="0" baseline="0" dirty="0">
                 <a:ln>
                   <a:noFill/>
                 </a:ln>
@@ -21073,7 +21906,7 @@
               </a:rPr>
             </a:br>
             <a:r>
-              <a:rPr kumimoji="0" lang="nl-BE" altLang="nl-BE" sz="2000" b="0" i="0" u="none" strike="noStrike" cap="none" normalizeH="0" baseline="0">
+              <a:rPr kumimoji="0" lang="nl-BE" altLang="nl-BE" sz="2000" b="0" i="0" u="none" strike="noStrike" cap="none" normalizeH="0" baseline="0" dirty="0">
                 <a:ln>
                   <a:noFill/>
                 </a:ln>
@@ -21086,7 +21919,7 @@
               <a:t>    </a:t>
             </a:r>
             <a:r>
-              <a:rPr kumimoji="0" lang="nl-BE" altLang="nl-BE" sz="2000" b="0" i="0" u="none" strike="noStrike" cap="none" normalizeH="0" baseline="0">
+              <a:rPr kumimoji="0" lang="nl-BE" altLang="nl-BE" sz="2000" b="0" i="0" u="none" strike="noStrike" cap="none" normalizeH="0" baseline="0" dirty="0">
                 <a:ln>
                   <a:noFill/>
                 </a:ln>
@@ -21099,7 +21932,7 @@
               <a:t>print</a:t>
             </a:r>
             <a:r>
-              <a:rPr kumimoji="0" lang="nl-BE" altLang="nl-BE" sz="2000" b="0" i="0" u="none" strike="noStrike" cap="none" normalizeH="0" baseline="0">
+              <a:rPr kumimoji="0" lang="nl-BE" altLang="nl-BE" sz="2000" b="0" i="0" u="none" strike="noStrike" cap="none" normalizeH="0" baseline="0" dirty="0">
                 <a:ln>
                   <a:noFill/>
                 </a:ln>
@@ -21112,7 +21945,7 @@
               <a:t>(element)</a:t>
             </a:r>
             <a:br>
-              <a:rPr kumimoji="0" lang="nl-BE" altLang="nl-BE" sz="2000" b="0" i="0" u="none" strike="noStrike" cap="none" normalizeH="0" baseline="0">
+              <a:rPr kumimoji="0" lang="nl-BE" altLang="nl-BE" sz="2000" b="0" i="0" u="none" strike="noStrike" cap="none" normalizeH="0" baseline="0" dirty="0">
                 <a:ln>
                   <a:noFill/>
                 </a:ln>
@@ -21123,33 +21956,7 @@
                 <a:latin typeface="Consolas" panose="020B0609020204030204" pitchFamily="49" charset="0"/>
               </a:rPr>
             </a:br>
-            <a:r>
-              <a:rPr kumimoji="0" lang="nl-BE" altLang="nl-BE" sz="2000" b="0" i="0" u="none" strike="noStrike" cap="none" normalizeH="0" baseline="0">
-                <a:ln>
-                  <a:noFill/>
-                </a:ln>
-                <a:solidFill>
-                  <a:srgbClr val="000080"/>
-                </a:solidFill>
-                <a:effectLst/>
-                <a:latin typeface="Consolas" panose="020B0609020204030204" pitchFamily="49" charset="0"/>
-              </a:rPr>
-              <a:t>print</a:t>
-            </a:r>
-            <a:r>
-              <a:rPr kumimoji="0" lang="nl-BE" altLang="nl-BE" sz="2000" b="0" i="0" u="none" strike="noStrike" cap="none" normalizeH="0" baseline="0">
-                <a:ln>
-                  <a:noFill/>
-                </a:ln>
-                <a:solidFill>
-                  <a:srgbClr val="080808"/>
-                </a:solidFill>
-                <a:effectLst/>
-                <a:latin typeface="Consolas" panose="020B0609020204030204" pitchFamily="49" charset="0"/>
-              </a:rPr>
-              <a:t>()</a:t>
-            </a:r>
-            <a:endParaRPr kumimoji="0" lang="nl-BE" altLang="nl-BE" sz="2000" b="0" i="0" u="none" strike="noStrike" cap="none" normalizeH="0" baseline="0">
+            <a:endParaRPr kumimoji="0" lang="nl-BE" altLang="nl-BE" sz="2000" b="0" i="0" u="none" strike="noStrike" cap="none" normalizeH="0" baseline="0" dirty="0">
               <a:ln>
                 <a:noFill/>
               </a:ln>

</xml_diff>